<commit_message>
updates on intro slides
</commit_message>
<xml_diff>
--- a/Aulas/ApresentacaoEIntroducaoAESSGraduacao/CourseOverview.pptx
+++ b/Aulas/ApresentacaoEIntroducaoAESSGraduacao/CourseOverview.pptx
@@ -5,38 +5,37 @@
     <p:sldMasterId id="2147483648" r:id="rId1"/>
   </p:sldMasterIdLst>
   <p:notesMasterIdLst>
-    <p:notesMasterId r:id="rId31"/>
+    <p:notesMasterId r:id="rId30"/>
   </p:notesMasterIdLst>
   <p:sldIdLst>
     <p:sldId id="256" r:id="rId2"/>
     <p:sldId id="257" r:id="rId3"/>
     <p:sldId id="259" r:id="rId4"/>
     <p:sldId id="260" r:id="rId5"/>
-    <p:sldId id="261" r:id="rId6"/>
-    <p:sldId id="262" r:id="rId7"/>
-    <p:sldId id="263" r:id="rId8"/>
-    <p:sldId id="264" r:id="rId9"/>
-    <p:sldId id="265" r:id="rId10"/>
-    <p:sldId id="266" r:id="rId11"/>
-    <p:sldId id="268" r:id="rId12"/>
-    <p:sldId id="270" r:id="rId13"/>
-    <p:sldId id="271" r:id="rId14"/>
-    <p:sldId id="273" r:id="rId15"/>
-    <p:sldId id="274" r:id="rId16"/>
-    <p:sldId id="275" r:id="rId17"/>
-    <p:sldId id="276" r:id="rId18"/>
-    <p:sldId id="277" r:id="rId19"/>
-    <p:sldId id="278" r:id="rId20"/>
-    <p:sldId id="279" r:id="rId21"/>
-    <p:sldId id="280" r:id="rId22"/>
-    <p:sldId id="281" r:id="rId23"/>
-    <p:sldId id="282" r:id="rId24"/>
-    <p:sldId id="283" r:id="rId25"/>
-    <p:sldId id="284" r:id="rId26"/>
-    <p:sldId id="285" r:id="rId27"/>
-    <p:sldId id="298" r:id="rId28"/>
-    <p:sldId id="300" r:id="rId29"/>
-    <p:sldId id="302" r:id="rId30"/>
+    <p:sldId id="262" r:id="rId6"/>
+    <p:sldId id="263" r:id="rId7"/>
+    <p:sldId id="264" r:id="rId8"/>
+    <p:sldId id="265" r:id="rId9"/>
+    <p:sldId id="266" r:id="rId10"/>
+    <p:sldId id="268" r:id="rId11"/>
+    <p:sldId id="270" r:id="rId12"/>
+    <p:sldId id="271" r:id="rId13"/>
+    <p:sldId id="273" r:id="rId14"/>
+    <p:sldId id="274" r:id="rId15"/>
+    <p:sldId id="275" r:id="rId16"/>
+    <p:sldId id="276" r:id="rId17"/>
+    <p:sldId id="277" r:id="rId18"/>
+    <p:sldId id="278" r:id="rId19"/>
+    <p:sldId id="279" r:id="rId20"/>
+    <p:sldId id="280" r:id="rId21"/>
+    <p:sldId id="281" r:id="rId22"/>
+    <p:sldId id="282" r:id="rId23"/>
+    <p:sldId id="283" r:id="rId24"/>
+    <p:sldId id="284" r:id="rId25"/>
+    <p:sldId id="285" r:id="rId26"/>
+    <p:sldId id="298" r:id="rId27"/>
+    <p:sldId id="300" r:id="rId28"/>
+    <p:sldId id="302" r:id="rId29"/>
   </p:sldIdLst>
   <p:sldSz cx="13004800" cy="9753600"/>
   <p:notesSz cx="6858000" cy="9144000"/>
@@ -4454,7 +4453,7 @@
           </a:ln>
           <a:extLst>
             <a:ext uri="{C572A759-6A51-4108-AA02-DFA0A04FC94B}">
-              <ma14:wrappingTextBoxFlag xmlns:ma14="http://schemas.microsoft.com/office/mac/drawingml/2011/main" xmlns:a14="http://schemas.microsoft.com/office/drawing/2010/main" xmlns:m="http://schemas.openxmlformats.org/officeDocument/2006/math" xmlns="" val="1"/>
+              <ma14:wrappingTextBoxFlag xmlns="" xmlns:m="http://schemas.openxmlformats.org/officeDocument/2006/math" xmlns:a14="http://schemas.microsoft.com/office/drawing/2010/main" xmlns:ma14="http://schemas.microsoft.com/office/mac/drawingml/2011/main" val="1"/>
             </a:ext>
           </a:extLst>
         </p:spPr>
@@ -4515,7 +4514,7 @@
           </a:ln>
           <a:extLst>
             <a:ext uri="{C572A759-6A51-4108-AA02-DFA0A04FC94B}">
-              <ma14:wrappingTextBoxFlag xmlns:ma14="http://schemas.microsoft.com/office/mac/drawingml/2011/main" xmlns:a14="http://schemas.microsoft.com/office/drawing/2010/main" xmlns:m="http://schemas.openxmlformats.org/officeDocument/2006/math" xmlns="" val="1"/>
+              <ma14:wrappingTextBoxFlag xmlns="" xmlns:m="http://schemas.openxmlformats.org/officeDocument/2006/math" xmlns:a14="http://schemas.microsoft.com/office/drawing/2010/main" xmlns:ma14="http://schemas.microsoft.com/office/mac/drawingml/2011/main" val="1"/>
             </a:ext>
           </a:extLst>
         </p:spPr>
@@ -5456,7 +5455,7 @@
           </a:ln>
           <a:extLst>
             <a:ext uri="{C572A759-6A51-4108-AA02-DFA0A04FC94B}">
-              <ma14:wrappingTextBoxFlag xmlns:ma14="http://schemas.microsoft.com/office/mac/drawingml/2011/main" xmlns:a14="http://schemas.microsoft.com/office/drawing/2010/main" xmlns:m="http://schemas.openxmlformats.org/officeDocument/2006/math" xmlns="" val="1"/>
+              <ma14:wrappingTextBoxFlag xmlns="" xmlns:m="http://schemas.openxmlformats.org/officeDocument/2006/math" xmlns:a14="http://schemas.microsoft.com/office/drawing/2010/main" xmlns:ma14="http://schemas.microsoft.com/office/mac/drawingml/2011/main" val="1"/>
             </a:ext>
           </a:extLst>
         </p:spPr>
@@ -5685,7 +5684,7 @@
       </p:grpSpPr>
       <p:sp>
         <p:nvSpPr>
-          <p:cNvPr id="255" name="Tasks and recommendations"/>
+          <p:cNvPr id="260" name="Course structure"/>
           <p:cNvSpPr txBox="1">
             <a:spLocks noGrp="1"/>
           </p:cNvSpPr>
@@ -5703,11 +5702,40 @@
           <a:lstStyle/>
           <a:p>
             <a:r>
-              <a:t>Tasks and recommendations</a:t>
-            </a:r>
-          </a:p>
-        </p:txBody>
-      </p:sp>
+              <a:t>Course structure</a:t>
+            </a:r>
+          </a:p>
+        </p:txBody>
+      </p:sp>
+      <p:pic>
+        <p:nvPicPr>
+          <p:cNvPr id="261" name="Image" descr="Image"/>
+          <p:cNvPicPr>
+            <a:picLocks noChangeAspect="1"/>
+          </p:cNvPicPr>
+          <p:nvPr/>
+        </p:nvPicPr>
+        <p:blipFill>
+          <a:blip r:embed="rId2">
+            <a:extLst/>
+          </a:blip>
+          <a:stretch>
+            <a:fillRect/>
+          </a:stretch>
+        </p:blipFill>
+        <p:spPr>
+          <a:xfrm>
+            <a:off x="2504519" y="2419012"/>
+            <a:ext cx="6858460" cy="7095588"/>
+          </a:xfrm>
+          <a:prstGeom prst="rect">
+            <a:avLst/>
+          </a:prstGeom>
+          <a:ln w="12700">
+            <a:miter lim="400000"/>
+          </a:ln>
+        </p:spPr>
+      </p:pic>
     </p:spTree>
   </p:cSld>
   <p:clrMapOvr>
@@ -5743,7 +5771,7 @@
       </p:grpSpPr>
       <p:sp>
         <p:nvSpPr>
-          <p:cNvPr id="260" name="Course structure"/>
+          <p:cNvPr id="266" name="Systems…"/>
           <p:cNvSpPr txBox="1">
             <a:spLocks noGrp="1"/>
           </p:cNvSpPr>
@@ -5752,6 +5780,10 @@
           </p:nvPr>
         </p:nvSpPr>
         <p:spPr>
+          <a:xfrm>
+            <a:off x="1270000" y="254000"/>
+            <a:ext cx="10464800" cy="3323075"/>
+          </a:xfrm>
           <a:prstGeom prst="rect">
             <a:avLst/>
           </a:prstGeom>
@@ -5761,40 +5793,70 @@
           <a:lstStyle/>
           <a:p>
             <a:r>
-              <a:t>Course structure</a:t>
-            </a:r>
-          </a:p>
-        </p:txBody>
-      </p:sp>
-      <p:pic>
-        <p:nvPicPr>
-          <p:cNvPr id="261" name="Image" descr="Image"/>
-          <p:cNvPicPr>
-            <a:picLocks noChangeAspect="1"/>
-          </p:cNvPicPr>
-          <p:nvPr/>
-        </p:nvPicPr>
-        <p:blipFill>
-          <a:blip r:embed="rId2">
-            <a:extLst/>
-          </a:blip>
-          <a:stretch>
-            <a:fillRect/>
-          </a:stretch>
-        </p:blipFill>
+              <a:rPr smtClean="0"/>
+              <a:t>Systems</a:t>
+            </a:r>
+            <a:endParaRPr/>
+          </a:p>
+        </p:txBody>
+      </p:sp>
+      <p:sp>
+        <p:nvSpPr>
+          <p:cNvPr id="267" name="Non trivial system…"/>
+          <p:cNvSpPr txBox="1">
+            <a:spLocks noGrp="1"/>
+          </p:cNvSpPr>
+          <p:nvPr>
+            <p:ph type="body" idx="1"/>
+          </p:nvPr>
+        </p:nvSpPr>
         <p:spPr>
           <a:xfrm>
-            <a:off x="2504519" y="2419012"/>
-            <a:ext cx="6858460" cy="7095588"/>
+            <a:off x="1270000" y="3019412"/>
+            <a:ext cx="10464800" cy="5933571"/>
           </a:xfrm>
           <a:prstGeom prst="rect">
             <a:avLst/>
           </a:prstGeom>
-          <a:ln w="12700">
-            <a:miter lim="400000"/>
-          </a:ln>
-        </p:spPr>
-      </p:pic>
+        </p:spPr>
+        <p:txBody>
+          <a:bodyPr/>
+          <a:lstStyle/>
+          <a:p>
+            <a:pPr>
+              <a:defRPr sz="4000"/>
+            </a:pPr>
+            <a:r>
+              <a:t>Non trivial system </a:t>
+            </a:r>
+          </a:p>
+          <a:p>
+            <a:pPr>
+              <a:defRPr sz="4000"/>
+            </a:pPr>
+            <a:r>
+              <a:t>Frequent access to the stakeholders is mandatory</a:t>
+            </a:r>
+          </a:p>
+          <a:p>
+            <a:pPr>
+              <a:defRPr sz="4000"/>
+            </a:pPr>
+            <a:r>
+              <a:t>Developed with the technology used in the example discussed in </a:t>
+            </a:r>
+            <a:r>
+              <a:rPr/>
+              <a:t>the </a:t>
+            </a:r>
+            <a:r>
+              <a:rPr smtClean="0"/>
+              <a:t>course</a:t>
+            </a:r>
+            <a:endParaRPr/>
+          </a:p>
+        </p:txBody>
+      </p:sp>
     </p:spTree>
   </p:cSld>
   <p:clrMapOvr>
@@ -5830,7 +5892,7 @@
       </p:grpSpPr>
       <p:sp>
         <p:nvSpPr>
-          <p:cNvPr id="266" name="Systems…"/>
+          <p:cNvPr id="271" name="My expectations"/>
           <p:cNvSpPr txBox="1">
             <a:spLocks noGrp="1"/>
           </p:cNvSpPr>
@@ -5839,10 +5901,6 @@
           </p:nvPr>
         </p:nvSpPr>
         <p:spPr>
-          <a:xfrm>
-            <a:off x="1270000" y="254000"/>
-            <a:ext cx="10464800" cy="3323075"/>
-          </a:xfrm>
           <a:prstGeom prst="rect">
             <a:avLst/>
           </a:prstGeom>
@@ -5851,17 +5909,16 @@
           <a:bodyPr/>
           <a:lstStyle/>
           <a:p>
-            <a:r>
-              <a:rPr smtClean="0"/>
-              <a:t>Systems</a:t>
-            </a:r>
-            <a:endParaRPr/>
-          </a:p>
-        </p:txBody>
-      </p:sp>
-      <p:sp>
-        <p:nvSpPr>
-          <p:cNvPr id="267" name="Non trivial system…"/>
+            <a:pPr lvl="1"/>
+            <a:r>
+              <a:t>My expectations</a:t>
+            </a:r>
+          </a:p>
+        </p:txBody>
+      </p:sp>
+      <p:sp>
+        <p:nvSpPr>
+          <p:cNvPr id="272" name="Ethical behavior (fraud implies in failing the course)…"/>
           <p:cNvSpPr txBox="1">
             <a:spLocks noGrp="1"/>
           </p:cNvSpPr>
@@ -5871,8 +5928,8 @@
         </p:nvSpPr>
         <p:spPr>
           <a:xfrm>
-            <a:off x="1270000" y="3019412"/>
-            <a:ext cx="10464800" cy="5933571"/>
+            <a:off x="800604" y="2179869"/>
+            <a:ext cx="12059778" cy="7779799"/>
           </a:xfrm>
           <a:prstGeom prst="rect">
             <a:avLst/>
@@ -5882,35 +5939,93 @@
           <a:bodyPr/>
           <a:lstStyle/>
           <a:p>
-            <a:pPr>
-              <a:defRPr sz="4000"/>
+            <a:pPr marL="834571" indent="-517071">
+              <a:defRPr sz="3800"/>
             </a:pPr>
             <a:r>
-              <a:t>Non trivial system </a:t>
-            </a:r>
-          </a:p>
-          <a:p>
-            <a:pPr>
-              <a:defRPr sz="4000"/>
+              <a:t>Ethical behavior (</a:t>
+            </a:r>
+            <a:r>
+              <a:rPr>
+                <a:solidFill>
+                  <a:srgbClr val="FEFB27"/>
+                </a:solidFill>
+              </a:rPr>
+              <a:t>fraud implies in failing the course</a:t>
+            </a:r>
+            <a:r>
+              <a:t>)</a:t>
+            </a:r>
+          </a:p>
+          <a:p>
+            <a:pPr marL="834571" indent="-517071">
+              <a:defRPr sz="3800"/>
             </a:pPr>
             <a:r>
-              <a:t>Frequent access to the stakeholders is mandatory</a:t>
-            </a:r>
-          </a:p>
-          <a:p>
-            <a:pPr>
-              <a:defRPr sz="4000"/>
+              <a:rPr lang="en-US" dirty="0" smtClean="0"/>
+              <a:t>Engagement!</a:t>
+            </a:r>
+          </a:p>
+          <a:p>
+            <a:pPr marL="1279071" lvl="1" indent="-517071">
+              <a:defRPr sz="3800"/>
             </a:pPr>
             <a:r>
-              <a:t>Developed with the technology used in the example discussed in the course</a:t>
-            </a:r>
-          </a:p>
-          <a:p>
-            <a:pPr>
-              <a:defRPr sz="4000"/>
+              <a:rPr lang="en-US" dirty="0" smtClean="0"/>
+              <a:t>Ask questions</a:t>
+            </a:r>
+          </a:p>
+          <a:p>
+            <a:pPr marL="1279071" lvl="1" indent="-517071">
+              <a:defRPr sz="3800"/>
             </a:pPr>
             <a:r>
-              <a:t>Existing or new system (and small, in case of new)</a:t>
+              <a:rPr smtClean="0"/>
+              <a:t>Attendance </a:t>
+            </a:r>
+            <a:r>
+              <a:t>to all classes and evaluation sessions (unless progress is shown </a:t>
+            </a:r>
+            <a:r>
+              <a:rPr>
+                <a:solidFill>
+                  <a:srgbClr val="FEFB27"/>
+                </a:solidFill>
+              </a:rPr>
+              <a:t>before</a:t>
+            </a:r>
+            <a:r>
+              <a:t> class)</a:t>
+            </a:r>
+          </a:p>
+          <a:p>
+            <a:pPr marL="1279071" lvl="1" indent="-517071">
+              <a:defRPr sz="3800"/>
+            </a:pPr>
+            <a:r>
+              <a:rPr smtClean="0"/>
+              <a:t>Punctuality</a:t>
+            </a:r>
+            <a:endParaRPr lang="en-US" dirty="0" smtClean="0"/>
+          </a:p>
+          <a:p>
+            <a:pPr marL="834571" indent="-517071">
+              <a:defRPr sz="3800"/>
+            </a:pPr>
+            <a:r>
+              <a:rPr smtClean="0"/>
+              <a:t>Good </a:t>
+            </a:r>
+            <a:r>
+              <a:t>time management and minimum dedication of 10-12 hours a week (including classes)</a:t>
+            </a:r>
+          </a:p>
+          <a:p>
+            <a:pPr marL="834571" indent="-517071">
+              <a:defRPr sz="3800"/>
+            </a:pPr>
+            <a:r>
+              <a:t>Behave as CS elite</a:t>
             </a:r>
           </a:p>
         </p:txBody>
@@ -5950,7 +6065,7 @@
       </p:grpSpPr>
       <p:sp>
         <p:nvSpPr>
-          <p:cNvPr id="271" name="My expectations"/>
+          <p:cNvPr id="277" name="Textbook"/>
           <p:cNvSpPr txBox="1">
             <a:spLocks noGrp="1"/>
           </p:cNvSpPr>
@@ -5967,95 +6082,156 @@
           <a:bodyPr/>
           <a:lstStyle/>
           <a:p>
-            <a:pPr lvl="1"/>
-            <a:r>
-              <a:t>My expectations</a:t>
-            </a:r>
-          </a:p>
-        </p:txBody>
-      </p:sp>
-      <p:sp>
-        <p:nvSpPr>
-          <p:cNvPr id="272" name="Ethical behavior (fraud implies in failing the course)…"/>
-          <p:cNvSpPr txBox="1">
-            <a:spLocks noGrp="1"/>
-          </p:cNvSpPr>
-          <p:nvPr>
-            <p:ph type="body" idx="1"/>
-          </p:nvPr>
+            <a:r>
+              <a:t>Textbook</a:t>
+            </a:r>
+          </a:p>
+        </p:txBody>
+      </p:sp>
+      <p:sp>
+        <p:nvSpPr>
+          <p:cNvPr id="278" name="Engineering Software as a Service: An Agile Approach Using Cloud Computing…"/>
+          <p:cNvSpPr txBox="1"/>
+          <p:nvPr/>
         </p:nvSpPr>
         <p:spPr>
           <a:xfrm>
-            <a:off x="800604" y="2179869"/>
-            <a:ext cx="12059778" cy="7779799"/>
+            <a:off x="1097021" y="2665790"/>
+            <a:ext cx="10810758" cy="4886828"/>
           </a:xfrm>
           <a:prstGeom prst="rect">
             <a:avLst/>
           </a:prstGeom>
-        </p:spPr>
-        <p:txBody>
-          <a:bodyPr/>
+          <a:ln w="12700">
+            <a:miter lim="400000"/>
+          </a:ln>
+          <a:extLst>
+            <a:ext uri="{C572A759-6A51-4108-AA02-DFA0A04FC94B}">
+              <ma14:wrappingTextBoxFlag xmlns="" xmlns:m="http://schemas.openxmlformats.org/officeDocument/2006/math" xmlns:a14="http://schemas.microsoft.com/office/drawing/2010/main" xmlns:ma14="http://schemas.microsoft.com/office/mac/drawingml/2011/main" val="1"/>
+            </a:ext>
+          </a:extLst>
+        </p:spPr>
+        <p:txBody>
+          <a:bodyPr lIns="50800" tIns="50800" rIns="50800" bIns="50800" anchor="ctr">
+            <a:spAutoFit/>
+          </a:bodyPr>
           <a:lstStyle/>
           <a:p>
-            <a:pPr marL="834571" indent="-517071">
-              <a:defRPr sz="3800"/>
-            </a:pPr>
-            <a:r>
-              <a:t>Ethical behavior (</a:t>
-            </a:r>
-            <a:r>
-              <a:rPr>
+            <a:pPr algn="ctr">
+              <a:defRPr sz="3700">
                 <a:solidFill>
                   <a:srgbClr val="FEFB27"/>
                 </a:solidFill>
+                <a:latin typeface="Arial"/>
+                <a:ea typeface="Arial"/>
+                <a:cs typeface="Arial"/>
+                <a:sym typeface="Arial"/>
+              </a:defRPr>
+            </a:pPr>
+            <a:r>
+              <a:t>Engineering Software as a Service: An Agile Approach Using Cloud Computing</a:t>
+            </a:r>
+          </a:p>
+          <a:p>
+            <a:pPr algn="ctr">
+              <a:defRPr sz="3700">
+                <a:solidFill>
+                  <a:srgbClr val="FFFFFF"/>
+                </a:solidFill>
+                <a:latin typeface="Arial"/>
+                <a:ea typeface="Arial"/>
+                <a:cs typeface="Arial"/>
+                <a:sym typeface="Arial"/>
+              </a:defRPr>
+            </a:pPr>
+            <a:endParaRPr/>
+          </a:p>
+          <a:p>
+            <a:pPr algn="ctr">
+              <a:defRPr sz="3700">
+                <a:solidFill>
+                  <a:srgbClr val="FFFFFF"/>
+                </a:solidFill>
+                <a:latin typeface="Arial"/>
+                <a:ea typeface="Arial"/>
+                <a:cs typeface="Arial"/>
+                <a:sym typeface="Arial"/>
+              </a:defRPr>
+            </a:pPr>
+            <a:r>
+              <a:t>by </a:t>
+            </a:r>
+            <a:r>
+              <a:rPr>
+                <a:hlinkClick r:id="rId2"/>
               </a:rPr>
-              <a:t>fraud implies in failing the course</a:t>
-            </a:r>
-            <a:r>
-              <a:t>)</a:t>
-            </a:r>
-          </a:p>
-          <a:p>
-            <a:pPr marL="834571" indent="-517071">
-              <a:defRPr sz="3800"/>
+              <a:t>David Patterson</a:t>
+            </a:r>
+            <a:r>
+              <a:t> and </a:t>
+            </a:r>
+            <a:r>
+              <a:rPr>
+                <a:hlinkClick r:id="rId3"/>
+              </a:rPr>
+              <a:t>Armando Fox</a:t>
+            </a:r>
+            <a:r>
+              <a:t> </a:t>
+            </a:r>
+          </a:p>
+          <a:p>
+            <a:pPr algn="ctr">
+              <a:defRPr sz="3700">
+                <a:solidFill>
+                  <a:srgbClr val="FFFFFF"/>
+                </a:solidFill>
+                <a:latin typeface="Arial"/>
+                <a:ea typeface="Arial"/>
+                <a:cs typeface="Arial"/>
+                <a:sym typeface="Arial"/>
+              </a:defRPr>
             </a:pPr>
-            <a:r>
-              <a:t>Attendance to all classes and evaluation sessions (unless progress is shown </a:t>
-            </a:r>
-            <a:r>
-              <a:rPr>
+            <a:endParaRPr/>
+          </a:p>
+          <a:p>
+            <a:pPr algn="ctr">
+              <a:defRPr sz="3700">
                 <a:solidFill>
-                  <a:srgbClr val="FEFB27"/>
+                  <a:srgbClr val="FFFFFF"/>
                 </a:solidFill>
+                <a:latin typeface="Arial"/>
+                <a:ea typeface="Arial"/>
+                <a:cs typeface="Arial"/>
+                <a:sym typeface="Arial"/>
+              </a:defRPr>
+            </a:pPr>
+            <a:r>
+              <a:rPr u="sng">
+                <a:hlinkClick r:id="rId4"/>
               </a:rPr>
-              <a:t>before</a:t>
-            </a:r>
-            <a:r>
-              <a:t> class)</a:t>
-            </a:r>
-          </a:p>
-          <a:p>
-            <a:pPr marL="834571" indent="-517071">
-              <a:defRPr sz="3800"/>
+              <a:t>http://www.saasbook.info</a:t>
+            </a:r>
+            <a:r>
+              <a:t/>
+            </a:r>
+            <a:br/>
+            <a:endParaRPr/>
+          </a:p>
+          <a:p>
+            <a:pPr algn="ctr">
+              <a:defRPr sz="3700">
+                <a:solidFill>
+                  <a:srgbClr val="FFFFFF"/>
+                </a:solidFill>
+                <a:latin typeface="Arial"/>
+                <a:ea typeface="Arial"/>
+                <a:cs typeface="Arial"/>
+                <a:sym typeface="Arial"/>
+              </a:defRPr>
             </a:pPr>
             <a:r>
-              <a:t>Punctuality</a:t>
-            </a:r>
-          </a:p>
-          <a:p>
-            <a:pPr marL="834571" indent="-517071">
-              <a:defRPr sz="3800"/>
-            </a:pPr>
-            <a:r>
-              <a:t>Good time management and minimum dedication of 10-12 hours a week (including classes)</a:t>
-            </a:r>
-          </a:p>
-          <a:p>
-            <a:pPr marL="834571" indent="-517071">
-              <a:defRPr sz="3800"/>
-            </a:pPr>
-            <a:r>
-              <a:t>Behave as CS elite</a:t>
+              <a:t>(Portuguese version is available, but English skills are very important for a software engineer)</a:t>
             </a:r>
           </a:p>
         </p:txBody>
@@ -6095,7 +6271,7 @@
       </p:grpSpPr>
       <p:sp>
         <p:nvSpPr>
-          <p:cNvPr id="277" name="Textbook"/>
+          <p:cNvPr id="280" name="You should primarily study by reading the textbook!"/>
           <p:cNvSpPr txBox="1">
             <a:spLocks noGrp="1"/>
           </p:cNvSpPr>
@@ -6104,6 +6280,10 @@
           </p:nvPr>
         </p:nvSpPr>
         <p:spPr>
+          <a:xfrm>
+            <a:off x="1287426" y="1447776"/>
+            <a:ext cx="10464800" cy="4301090"/>
+          </a:xfrm>
           <a:prstGeom prst="rect">
             <a:avLst/>
           </a:prstGeom>
@@ -6113,21 +6293,21 @@
           <a:lstStyle/>
           <a:p>
             <a:r>
-              <a:t>Textbook</a:t>
-            </a:r>
-          </a:p>
-        </p:txBody>
-      </p:sp>
-      <p:sp>
-        <p:nvSpPr>
-          <p:cNvPr id="278" name="Engineering Software as a Service: An Agile Approach Using Cloud Computing…"/>
+              <a:t>You should primarily study by reading the textbook!</a:t>
+            </a:r>
+          </a:p>
+        </p:txBody>
+      </p:sp>
+      <p:sp>
+        <p:nvSpPr>
+          <p:cNvPr id="281" name="Studying by reading the slides and wikipedia is a very bad idea!"/>
           <p:cNvSpPr txBox="1"/>
           <p:nvPr/>
         </p:nvSpPr>
         <p:spPr>
           <a:xfrm>
-            <a:off x="1097021" y="2665790"/>
-            <a:ext cx="10810758" cy="4886828"/>
+            <a:off x="1073112" y="6805626"/>
+            <a:ext cx="10810758" cy="1554027"/>
           </a:xfrm>
           <a:prstGeom prst="rect">
             <a:avLst/>
@@ -6137,7 +6317,7 @@
           </a:ln>
           <a:extLst>
             <a:ext uri="{C572A759-6A51-4108-AA02-DFA0A04FC94B}">
-              <ma14:wrappingTextBoxFlag xmlns:ma14="http://schemas.microsoft.com/office/mac/drawingml/2011/main" xmlns:a14="http://schemas.microsoft.com/office/drawing/2010/main" xmlns:m="http://schemas.openxmlformats.org/officeDocument/2006/math" xmlns="" val="1"/>
+              <ma14:wrappingTextBoxFlag xmlns="" xmlns:m="http://schemas.openxmlformats.org/officeDocument/2006/math" xmlns:a14="http://schemas.microsoft.com/office/drawing/2010/main" xmlns:ma14="http://schemas.microsoft.com/office/mac/drawingml/2011/main" val="1"/>
             </a:ext>
           </a:extLst>
         </p:spPr>
@@ -6148,23 +6328,7 @@
           <a:lstStyle/>
           <a:p>
             <a:pPr algn="ctr">
-              <a:defRPr sz="3700">
-                <a:solidFill>
-                  <a:srgbClr val="FEFB27"/>
-                </a:solidFill>
-                <a:latin typeface="Arial"/>
-                <a:ea typeface="Arial"/>
-                <a:cs typeface="Arial"/>
-                <a:sym typeface="Arial"/>
-              </a:defRPr>
-            </a:pPr>
-            <a:r>
-              <a:t>Engineering Software as a Service: An Agile Approach Using Cloud Computing</a:t>
-            </a:r>
-          </a:p>
-          <a:p>
-            <a:pPr algn="ctr">
-              <a:defRPr sz="3700">
+              <a:defRPr sz="5000">
                 <a:solidFill>
                   <a:srgbClr val="FFFFFF"/>
                 </a:solidFill>
@@ -6174,94 +6338,30 @@
                 <a:sym typeface="Arial"/>
               </a:defRPr>
             </a:pPr>
-            <a:endParaRPr/>
-          </a:p>
-          <a:p>
-            <a:pPr algn="ctr">
-              <a:defRPr sz="3700">
+            <a:r>
+              <a:t>Studying by reading the </a:t>
+            </a:r>
+            <a:r>
+              <a:rPr>
                 <a:solidFill>
-                  <a:srgbClr val="FFFFFF"/>
+                  <a:srgbClr val="FEFB27"/>
                 </a:solidFill>
-                <a:latin typeface="Arial"/>
-                <a:ea typeface="Arial"/>
-                <a:cs typeface="Arial"/>
-                <a:sym typeface="Arial"/>
-              </a:defRPr>
-            </a:pPr>
-            <a:r>
-              <a:t>by </a:t>
+              </a:rPr>
+              <a:t>slides</a:t>
+            </a:r>
+            <a:r>
+              <a:t> and </a:t>
             </a:r>
             <a:r>
               <a:rPr>
-                <a:hlinkClick r:id="rId2"/>
+                <a:solidFill>
+                  <a:srgbClr val="FEFB27"/>
+                </a:solidFill>
               </a:rPr>
-              <a:t>David Patterson</a:t>
-            </a:r>
-            <a:r>
-              <a:t> and </a:t>
-            </a:r>
-            <a:r>
-              <a:rPr>
-                <a:hlinkClick r:id="rId3"/>
-              </a:rPr>
-              <a:t>Armando Fox</a:t>
-            </a:r>
-            <a:r>
-              <a:t> </a:t>
-            </a:r>
-          </a:p>
-          <a:p>
-            <a:pPr algn="ctr">
-              <a:defRPr sz="3700">
-                <a:solidFill>
-                  <a:srgbClr val="FFFFFF"/>
-                </a:solidFill>
-                <a:latin typeface="Arial"/>
-                <a:ea typeface="Arial"/>
-                <a:cs typeface="Arial"/>
-                <a:sym typeface="Arial"/>
-              </a:defRPr>
-            </a:pPr>
-            <a:endParaRPr/>
-          </a:p>
-          <a:p>
-            <a:pPr algn="ctr">
-              <a:defRPr sz="3700">
-                <a:solidFill>
-                  <a:srgbClr val="FFFFFF"/>
-                </a:solidFill>
-                <a:latin typeface="Arial"/>
-                <a:ea typeface="Arial"/>
-                <a:cs typeface="Arial"/>
-                <a:sym typeface="Arial"/>
-              </a:defRPr>
-            </a:pPr>
-            <a:r>
-              <a:rPr u="sng">
-                <a:hlinkClick r:id="rId4"/>
-              </a:rPr>
-              <a:t>http://www.saasbook.info</a:t>
-            </a:r>
-            <a:r>
-              <a:t/>
-            </a:r>
-            <a:br/>
-            <a:endParaRPr/>
-          </a:p>
-          <a:p>
-            <a:pPr algn="ctr">
-              <a:defRPr sz="3700">
-                <a:solidFill>
-                  <a:srgbClr val="FFFFFF"/>
-                </a:solidFill>
-                <a:latin typeface="Arial"/>
-                <a:ea typeface="Arial"/>
-                <a:cs typeface="Arial"/>
-                <a:sym typeface="Arial"/>
-              </a:defRPr>
-            </a:pPr>
-            <a:r>
-              <a:t>(Portuguese version is available, but English skills are very important for a software engineer)</a:t>
+              <a:t>wikipedia</a:t>
+            </a:r>
+            <a:r>
+              <a:t> is a very bad idea!</a:t>
             </a:r>
           </a:p>
         </p:txBody>
@@ -6301,7 +6401,7 @@
       </p:grpSpPr>
       <p:sp>
         <p:nvSpPr>
-          <p:cNvPr id="280" name="You should primarily study by reading the textbook!"/>
+          <p:cNvPr id="285" name="Classes are for discussing the material studied before the class"/>
           <p:cNvSpPr txBox="1">
             <a:spLocks noGrp="1"/>
           </p:cNvSpPr>
@@ -6311,8 +6411,8 @@
         </p:nvSpPr>
         <p:spPr>
           <a:xfrm>
-            <a:off x="1287426" y="1447776"/>
-            <a:ext cx="10464800" cy="4301090"/>
+            <a:off x="1358864" y="376206"/>
+            <a:ext cx="10464800" cy="4973385"/>
           </a:xfrm>
           <a:prstGeom prst="rect">
             <a:avLst/>
@@ -6323,21 +6423,21 @@
           <a:lstStyle/>
           <a:p>
             <a:r>
-              <a:t>You should primarily study by reading the textbook!</a:t>
-            </a:r>
-          </a:p>
-        </p:txBody>
-      </p:sp>
-      <p:sp>
-        <p:nvSpPr>
-          <p:cNvPr id="281" name="Studying by reading the slides and wikipedia is a very bad idea!"/>
+              <a:t>Classes are for discussing the material studied before the class</a:t>
+            </a:r>
+          </a:p>
+        </p:txBody>
+      </p:sp>
+      <p:sp>
+        <p:nvSpPr>
+          <p:cNvPr id="286" name="Do not expect to learn only through classes!…"/>
           <p:cNvSpPr txBox="1"/>
           <p:nvPr/>
         </p:nvSpPr>
         <p:spPr>
           <a:xfrm>
-            <a:off x="1073112" y="6805626"/>
-            <a:ext cx="10810758" cy="1554027"/>
+            <a:off x="430170" y="4948238"/>
+            <a:ext cx="12144460" cy="4973385"/>
           </a:xfrm>
           <a:prstGeom prst="rect">
             <a:avLst/>
@@ -6347,51 +6447,52 @@
           </a:ln>
           <a:extLst>
             <a:ext uri="{C572A759-6A51-4108-AA02-DFA0A04FC94B}">
-              <ma14:wrappingTextBoxFlag xmlns:ma14="http://schemas.microsoft.com/office/mac/drawingml/2011/main" xmlns:a14="http://schemas.microsoft.com/office/drawing/2010/main" xmlns:m="http://schemas.openxmlformats.org/officeDocument/2006/math" xmlns="" val="1"/>
+              <ma14:wrappingTextBoxFlag xmlns="" xmlns:m="http://schemas.openxmlformats.org/officeDocument/2006/math" xmlns:a14="http://schemas.microsoft.com/office/drawing/2010/main" xmlns:ma14="http://schemas.microsoft.com/office/mac/drawingml/2011/main" val="1"/>
             </a:ext>
           </a:extLst>
         </p:spPr>
         <p:txBody>
-          <a:bodyPr lIns="50800" tIns="50800" rIns="50800" bIns="50800" anchor="ctr">
-            <a:spAutoFit/>
-          </a:bodyPr>
+          <a:bodyPr lIns="50800" tIns="50800" rIns="50800" bIns="50800" anchor="ctr"/>
           <a:lstStyle/>
           <a:p>
-            <a:pPr algn="ctr">
-              <a:defRPr sz="5000">
-                <a:solidFill>
-                  <a:srgbClr val="FFFFFF"/>
-                </a:solidFill>
-                <a:latin typeface="Arial"/>
-                <a:ea typeface="Arial"/>
-                <a:cs typeface="Arial"/>
-                <a:sym typeface="Arial"/>
-              </a:defRPr>
-            </a:pPr>
-            <a:r>
-              <a:t>Studying by reading the </a:t>
-            </a:r>
-            <a:r>
-              <a:rPr>
+            <a:pPr algn="ctr" defTabSz="584200">
+              <a:defRPr sz="7500">
                 <a:solidFill>
                   <a:srgbClr val="FEFB27"/>
                 </a:solidFill>
-              </a:rPr>
-              <a:t>slides</a:t>
-            </a:r>
-            <a:r>
-              <a:t> and </a:t>
-            </a:r>
-            <a:r>
-              <a:rPr>
+                <a:latin typeface="+mn-lt"/>
+                <a:ea typeface="+mn-ea"/>
+                <a:cs typeface="+mn-cs"/>
+                <a:sym typeface="Gill Sans"/>
+              </a:defRPr>
+            </a:pPr>
+            <a:r>
+              <a:t>Do not expect to learn only through </a:t>
+            </a:r>
+            <a:r>
+              <a:rPr/>
+              <a:t>classes</a:t>
+            </a:r>
+            <a:r>
+              <a:rPr smtClean="0"/>
+              <a:t>!</a:t>
+            </a:r>
+            <a:endParaRPr/>
+          </a:p>
+          <a:p>
+            <a:pPr algn="ctr" defTabSz="584200">
+              <a:defRPr sz="7500">
                 <a:solidFill>
                   <a:srgbClr val="FEFB27"/>
                 </a:solidFill>
-              </a:rPr>
-              <a:t>wikipedia</a:t>
-            </a:r>
-            <a:r>
-              <a:t> is a very bad idea!</a:t>
+                <a:latin typeface="+mn-lt"/>
+                <a:ea typeface="+mn-ea"/>
+                <a:cs typeface="+mn-cs"/>
+                <a:sym typeface="Gill Sans"/>
+              </a:defRPr>
+            </a:pPr>
+            <a:r>
+              <a:t>Watch, read and practice!</a:t>
             </a:r>
           </a:p>
         </p:txBody>
@@ -6431,7 +6532,7 @@
       </p:grpSpPr>
       <p:sp>
         <p:nvSpPr>
-          <p:cNvPr id="285" name="Classes are for discussing the material studied before the class"/>
+          <p:cNvPr id="288" name="Manage your time!…"/>
           <p:cNvSpPr txBox="1">
             <a:spLocks noGrp="1"/>
           </p:cNvSpPr>
@@ -6441,8 +6542,8 @@
         </p:nvSpPr>
         <p:spPr>
           <a:xfrm>
-            <a:off x="1358864" y="376206"/>
-            <a:ext cx="10464800" cy="4973385"/>
+            <a:off x="1270000" y="769917"/>
+            <a:ext cx="10464800" cy="6896047"/>
           </a:xfrm>
           <a:prstGeom prst="rect">
             <a:avLst/>
@@ -6452,77 +6553,35 @@
           <a:bodyPr/>
           <a:lstStyle/>
           <a:p>
-            <a:r>
-              <a:t>Classes are for discussing the material studied before the class</a:t>
-            </a:r>
-          </a:p>
-        </p:txBody>
-      </p:sp>
-      <p:sp>
-        <p:nvSpPr>
-          <p:cNvPr id="286" name="Do not expect to learn only through classes!…"/>
-          <p:cNvSpPr txBox="1"/>
-          <p:nvPr/>
-        </p:nvSpPr>
-        <p:spPr>
-          <a:xfrm>
-            <a:off x="430170" y="4948238"/>
-            <a:ext cx="12144460" cy="4973385"/>
-          </a:xfrm>
-          <a:prstGeom prst="rect">
-            <a:avLst/>
-          </a:prstGeom>
-          <a:ln w="12700">
-            <a:miter lim="400000"/>
-          </a:ln>
-          <a:extLst>
-            <a:ext uri="{C572A759-6A51-4108-AA02-DFA0A04FC94B}">
-              <ma14:wrappingTextBoxFlag xmlns:ma14="http://schemas.microsoft.com/office/mac/drawingml/2011/main" xmlns:a14="http://schemas.microsoft.com/office/drawing/2010/main" xmlns:m="http://schemas.openxmlformats.org/officeDocument/2006/math" xmlns="" val="1"/>
-            </a:ext>
-          </a:extLst>
-        </p:spPr>
-        <p:txBody>
-          <a:bodyPr lIns="50800" tIns="50800" rIns="50800" bIns="50800" anchor="ctr"/>
-          <a:lstStyle/>
-          <a:p>
-            <a:pPr algn="ctr" defTabSz="584200">
-              <a:defRPr sz="7500">
+            <a:pPr>
+              <a:defRPr sz="7900"/>
+            </a:pPr>
+            <a:endParaRPr/>
+          </a:p>
+          <a:p>
+            <a:pPr>
+              <a:defRPr sz="10800"/>
+            </a:pPr>
+            <a:r>
+              <a:t>Manage your time!</a:t>
+            </a:r>
+          </a:p>
+          <a:p>
+            <a:pPr>
+              <a:defRPr sz="7900"/>
+            </a:pPr>
+            <a:endParaRPr/>
+          </a:p>
+          <a:p>
+            <a:pPr>
+              <a:defRPr sz="7900">
                 <a:solidFill>
                   <a:srgbClr val="FEFB27"/>
                 </a:solidFill>
-                <a:latin typeface="+mn-lt"/>
-                <a:ea typeface="+mn-ea"/>
-                <a:cs typeface="+mn-cs"/>
-                <a:sym typeface="Gill Sans"/>
               </a:defRPr>
             </a:pPr>
             <a:r>
-              <a:t>Do not expect to learn only through </a:t>
-            </a:r>
-            <a:r>
-              <a:rPr/>
-              <a:t>classes</a:t>
-            </a:r>
-            <a:r>
-              <a:rPr smtClean="0"/>
-              <a:t>!</a:t>
-            </a:r>
-            <a:endParaRPr/>
-          </a:p>
-          <a:p>
-            <a:pPr algn="ctr" defTabSz="584200">
-              <a:defRPr sz="7500">
-                <a:solidFill>
-                  <a:srgbClr val="FEFB27"/>
-                </a:solidFill>
-                <a:latin typeface="+mn-lt"/>
-                <a:ea typeface="+mn-ea"/>
-                <a:cs typeface="+mn-cs"/>
-                <a:sym typeface="Gill Sans"/>
-              </a:defRPr>
-            </a:pPr>
-            <a:r>
-              <a:t>Watch, read and practice!</a:t>
+              <a:t>Make sure you make the most of this opportunity!</a:t>
             </a:r>
           </a:p>
         </p:txBody>
@@ -6562,57 +6621,157 @@
       </p:grpSpPr>
       <p:sp>
         <p:nvSpPr>
-          <p:cNvPr id="288" name="Manage your time!…"/>
+          <p:cNvPr id="290" name="https://classroom.google.com"/>
           <p:cNvSpPr txBox="1">
             <a:spLocks noGrp="1"/>
           </p:cNvSpPr>
           <p:nvPr>
-            <p:ph type="title"/>
+            <p:ph type="ctrTitle"/>
           </p:nvPr>
         </p:nvSpPr>
         <p:spPr>
           <a:xfrm>
-            <a:off x="1270000" y="769917"/>
-            <a:ext cx="10464800" cy="6896047"/>
+            <a:off x="358732" y="4166173"/>
+            <a:ext cx="12430212" cy="3424076"/>
           </a:xfrm>
           <a:prstGeom prst="rect">
             <a:avLst/>
           </a:prstGeom>
         </p:spPr>
         <p:txBody>
-          <a:bodyPr/>
+          <a:bodyPr anchor="t">
+            <a:noAutofit/>
+          </a:bodyPr>
+          <a:lstStyle>
+            <a:lvl1pPr defTabSz="531622">
+              <a:defRPr sz="7553" u="sng">
+                <a:hlinkClick r:id="rId3"/>
+              </a:defRPr>
+            </a:lvl1pPr>
+          </a:lstStyle>
+          <a:p>
+            <a:pPr algn="l">
+              <a:defRPr u="none"/>
+            </a:pPr>
+            <a:r>
+              <a:rPr lang="pt-BR" sz="4800" dirty="0" err="1" smtClean="0"/>
+              <a:t>Classroom</a:t>
+            </a:r>
+            <a:r>
+              <a:rPr lang="pt-BR" sz="4800" dirty="0" smtClean="0"/>
+              <a:t/>
+            </a:r>
+            <a:br>
+              <a:rPr lang="pt-BR" sz="4800" dirty="0" smtClean="0"/>
+            </a:br>
+            <a:r>
+              <a:rPr lang="pt-BR" sz="4800" dirty="0" smtClean="0"/>
+              <a:t/>
+            </a:r>
+            <a:br>
+              <a:rPr lang="pt-BR" sz="4800" dirty="0" smtClean="0"/>
+            </a:br>
+            <a:r>
+              <a:rPr lang="pt-BR" sz="4800" dirty="0" err="1" smtClean="0"/>
+              <a:t>GitHub</a:t>
+            </a:r>
+            <a:r>
+              <a:rPr lang="pt-BR" sz="4800" dirty="0" smtClean="0"/>
+              <a:t> (slides): </a:t>
+            </a:r>
+            <a:r>
+              <a:rPr lang="pt-BR" sz="4800" dirty="0" err="1" smtClean="0"/>
+              <a:t>damorim</a:t>
+            </a:r>
+            <a:r>
+              <a:rPr lang="pt-BR" sz="4800" dirty="0" smtClean="0"/>
+              <a:t>/</a:t>
+            </a:r>
+            <a:r>
+              <a:rPr lang="pt-BR" sz="4800" dirty="0" err="1" smtClean="0"/>
+              <a:t>software-engineering-courses</a:t>
+            </a:r>
+            <a:r>
+              <a:rPr lang="pt-BR" sz="4800" dirty="0" smtClean="0"/>
+              <a:t/>
+            </a:r>
+            <a:br>
+              <a:rPr lang="pt-BR" sz="4800" dirty="0" smtClean="0"/>
+            </a:br>
+            <a:r>
+              <a:rPr lang="pt-BR" sz="4800" dirty="0" smtClean="0"/>
+              <a:t/>
+            </a:r>
+            <a:br>
+              <a:rPr lang="pt-BR" sz="4800" dirty="0" smtClean="0"/>
+            </a:br>
+            <a:r>
+              <a:rPr lang="pt-BR" sz="4800" dirty="0" smtClean="0"/>
+              <a:t/>
+            </a:r>
+            <a:br>
+              <a:rPr lang="pt-BR" sz="4800" dirty="0" smtClean="0"/>
+            </a:br>
+            <a:r>
+              <a:rPr lang="pt-BR" sz="4800" dirty="0" smtClean="0"/>
+              <a:t/>
+            </a:r>
+            <a:br>
+              <a:rPr lang="pt-BR" sz="4800" dirty="0" smtClean="0"/>
+            </a:br>
+            <a:endParaRPr sz="4800" u="none">
+              <a:solidFill>
+                <a:srgbClr val="FF0000"/>
+              </a:solidFill>
+              <a:latin typeface="Agency FB" pitchFamily="34" charset="0"/>
+              <a:hlinkClick r:id="rId3"/>
+            </a:endParaRPr>
+          </a:p>
+        </p:txBody>
+      </p:sp>
+      <p:sp>
+        <p:nvSpPr>
+          <p:cNvPr id="291" name="Carefully follow the course site!"/>
+          <p:cNvSpPr txBox="1"/>
+          <p:nvPr/>
+        </p:nvSpPr>
+        <p:spPr>
+          <a:xfrm>
+            <a:off x="1215988" y="947710"/>
+            <a:ext cx="10464800" cy="2438400"/>
+          </a:xfrm>
+          <a:prstGeom prst="rect">
+            <a:avLst/>
+          </a:prstGeom>
+          <a:ln w="12700">
+            <a:miter lim="400000"/>
+          </a:ln>
+          <a:extLst>
+            <a:ext uri="{C572A759-6A51-4108-AA02-DFA0A04FC94B}">
+              <ma14:wrappingTextBoxFlag xmlns="" xmlns:m="http://schemas.openxmlformats.org/officeDocument/2006/math" xmlns:a14="http://schemas.microsoft.com/office/drawing/2010/main" xmlns:ma14="http://schemas.microsoft.com/office/mac/drawingml/2011/main" val="1"/>
+            </a:ext>
+          </a:extLst>
+        </p:spPr>
+        <p:txBody>
+          <a:bodyPr lIns="50800" tIns="50800" rIns="50800" bIns="50800" anchor="ctr"/>
           <a:lstStyle/>
           <a:p>
-            <a:pPr>
-              <a:defRPr sz="7900"/>
-            </a:pPr>
-            <a:endParaRPr/>
-          </a:p>
-          <a:p>
-            <a:pPr>
-              <a:defRPr sz="10800"/>
-            </a:pPr>
-            <a:r>
-              <a:t>Manage your time!</a:t>
-            </a:r>
-          </a:p>
-          <a:p>
-            <a:pPr>
-              <a:defRPr sz="7900"/>
-            </a:pPr>
-            <a:endParaRPr/>
-          </a:p>
-          <a:p>
-            <a:pPr>
-              <a:defRPr sz="7900">
+            <a:pPr lvl="1" algn="ctr" defTabSz="584200">
+              <a:defRPr sz="8400">
                 <a:solidFill>
                   <a:srgbClr val="FEFB27"/>
                 </a:solidFill>
+                <a:latin typeface="+mn-lt"/>
+                <a:ea typeface="+mn-ea"/>
+                <a:cs typeface="+mn-cs"/>
+                <a:sym typeface="Gill Sans"/>
               </a:defRPr>
             </a:pPr>
             <a:r>
-              <a:t>Make sure you make the most of this opportunity!</a:t>
-            </a:r>
+              <a:rPr lang="en-US" dirty="0" smtClean="0"/>
+              <a:t>Resources</a:t>
+            </a:r>
+            <a:endParaRPr/>
           </a:p>
         </p:txBody>
       </p:sp>
@@ -6651,128 +6810,14 @@
       </p:grpSpPr>
       <p:sp>
         <p:nvSpPr>
-          <p:cNvPr id="290" name="https://classroom.google.com"/>
-          <p:cNvSpPr txBox="1">
-            <a:spLocks noGrp="1"/>
-          </p:cNvSpPr>
-          <p:nvPr>
-            <p:ph type="ctrTitle"/>
-          </p:nvPr>
-        </p:nvSpPr>
-        <p:spPr>
-          <a:xfrm>
-            <a:off x="358732" y="4166173"/>
-            <a:ext cx="12430212" cy="3424076"/>
-          </a:xfrm>
-          <a:prstGeom prst="rect">
-            <a:avLst/>
-          </a:prstGeom>
-        </p:spPr>
-        <p:txBody>
-          <a:bodyPr anchor="t">
-            <a:noAutofit/>
-          </a:bodyPr>
-          <a:lstStyle>
-            <a:lvl1pPr defTabSz="531622">
-              <a:defRPr sz="7553" u="sng">
-                <a:hlinkClick r:id="rId3"/>
-              </a:defRPr>
-            </a:lvl1pPr>
-          </a:lstStyle>
-          <a:p>
-            <a:pPr algn="l">
-              <a:defRPr u="none"/>
-            </a:pPr>
-            <a:r>
-              <a:rPr lang="en-US" sz="4800" dirty="0" smtClean="0"/>
-              <a:t>Classroom: </a:t>
-            </a:r>
-            <a:r>
-              <a:rPr lang="pt-BR" sz="4800" dirty="0" smtClean="0"/>
-              <a:t>l4wnrtf</a:t>
-            </a:r>
-            <a:br>
-              <a:rPr lang="pt-BR" sz="4800" dirty="0" smtClean="0"/>
-            </a:br>
-            <a:r>
-              <a:rPr lang="pt-BR" sz="4800" dirty="0" smtClean="0"/>
-              <a:t/>
-            </a:r>
-            <a:br>
-              <a:rPr lang="pt-BR" sz="4800" dirty="0" smtClean="0"/>
-            </a:br>
-            <a:r>
-              <a:rPr lang="pt-BR" sz="4800" dirty="0" err="1" smtClean="0"/>
-              <a:t>GitHub</a:t>
-            </a:r>
-            <a:r>
-              <a:rPr lang="pt-BR" sz="4800" dirty="0" smtClean="0"/>
-              <a:t> </a:t>
-            </a:r>
-            <a:r>
-              <a:rPr lang="pt-BR" sz="4800" dirty="0" smtClean="0"/>
-              <a:t>(slides): </a:t>
-            </a:r>
-            <a:r>
-              <a:rPr lang="pt-BR" sz="4800" dirty="0" err="1" smtClean="0"/>
-              <a:t>damorim</a:t>
-            </a:r>
-            <a:r>
-              <a:rPr lang="pt-BR" sz="4800" dirty="0" smtClean="0"/>
-              <a:t>/</a:t>
-            </a:r>
-            <a:r>
-              <a:rPr lang="pt-BR" sz="4800" dirty="0" err="1" smtClean="0"/>
-              <a:t>software-engineering-courses</a:t>
-            </a:r>
-            <a:r>
-              <a:rPr lang="pt-BR" sz="4800" dirty="0" smtClean="0"/>
-              <a:t/>
-            </a:r>
-            <a:br>
-              <a:rPr lang="pt-BR" sz="4800" dirty="0" smtClean="0"/>
-            </a:br>
-            <a:r>
-              <a:rPr lang="pt-BR" sz="4800" dirty="0" smtClean="0"/>
-              <a:t/>
-            </a:r>
-            <a:br>
-              <a:rPr lang="pt-BR" sz="4800" dirty="0" smtClean="0"/>
-            </a:br>
-            <a:r>
-              <a:rPr lang="pt-BR" sz="4800" dirty="0" smtClean="0"/>
-              <a:t/>
-            </a:r>
-            <a:br>
-              <a:rPr lang="pt-BR" sz="4800" dirty="0" smtClean="0"/>
-            </a:br>
-            <a:r>
-              <a:rPr lang="pt-BR" sz="4800" dirty="0" smtClean="0"/>
-              <a:t/>
-            </a:r>
-            <a:br>
-              <a:rPr lang="pt-BR" sz="4800" dirty="0" smtClean="0"/>
-            </a:br>
-            <a:endParaRPr sz="4800" u="none">
-              <a:solidFill>
-                <a:srgbClr val="FF0000"/>
-              </a:solidFill>
-              <a:latin typeface="Agency FB" pitchFamily="34" charset="0"/>
-              <a:hlinkClick r:id="rId3"/>
-            </a:endParaRPr>
-          </a:p>
-        </p:txBody>
-      </p:sp>
-      <p:sp>
-        <p:nvSpPr>
-          <p:cNvPr id="291" name="Carefully follow the course site!"/>
+          <p:cNvPr id="295" name="Carefully follow the course guidelines!"/>
           <p:cNvSpPr txBox="1"/>
           <p:nvPr/>
         </p:nvSpPr>
         <p:spPr>
           <a:xfrm>
-            <a:off x="1215988" y="947710"/>
-            <a:ext cx="10464800" cy="2438400"/>
+            <a:off x="1270000" y="254000"/>
+            <a:ext cx="10464800" cy="2650386"/>
           </a:xfrm>
           <a:prstGeom prst="rect">
             <a:avLst/>
@@ -6782,7 +6827,7 @@
           </a:ln>
           <a:extLst>
             <a:ext uri="{C572A759-6A51-4108-AA02-DFA0A04FC94B}">
-              <ma14:wrappingTextBoxFlag xmlns:ma14="http://schemas.microsoft.com/office/mac/drawingml/2011/main" xmlns:a14="http://schemas.microsoft.com/office/drawing/2010/main" xmlns:m="http://schemas.openxmlformats.org/officeDocument/2006/math" xmlns="" val="1"/>
+              <ma14:wrappingTextBoxFlag xmlns="" xmlns:m="http://schemas.openxmlformats.org/officeDocument/2006/math" xmlns:a14="http://schemas.microsoft.com/office/drawing/2010/main" xmlns:ma14="http://schemas.microsoft.com/office/mac/drawingml/2011/main" val="1"/>
             </a:ext>
           </a:extLst>
         </p:spPr>
@@ -6802,10 +6847,59 @@
               </a:defRPr>
             </a:pPr>
             <a:r>
-              <a:rPr lang="en-US" dirty="0" smtClean="0"/>
-              <a:t>Resources</a:t>
-            </a:r>
-            <a:endParaRPr/>
+              <a:t>Carefully follow the course guidelines!</a:t>
+            </a:r>
+          </a:p>
+        </p:txBody>
+      </p:sp>
+      <p:sp>
+        <p:nvSpPr>
+          <p:cNvPr id="296" name="https://is.gd/essguidelines"/>
+          <p:cNvSpPr txBox="1"/>
+          <p:nvPr/>
+        </p:nvSpPr>
+        <p:spPr>
+          <a:xfrm>
+            <a:off x="2644748" y="4519610"/>
+            <a:ext cx="7369005" cy="1025922"/>
+          </a:xfrm>
+          <a:prstGeom prst="rect">
+            <a:avLst/>
+          </a:prstGeom>
+          <a:ln w="12700">
+            <a:miter lim="400000"/>
+          </a:ln>
+          <a:extLst>
+            <a:ext uri="{C572A759-6A51-4108-AA02-DFA0A04FC94B}">
+              <ma14:wrappingTextBoxFlag xmlns="" xmlns:m="http://schemas.openxmlformats.org/officeDocument/2006/math" xmlns:a14="http://schemas.microsoft.com/office/drawing/2010/main" xmlns:ma14="http://schemas.microsoft.com/office/mac/drawingml/2011/main" val="1"/>
+            </a:ext>
+          </a:extLst>
+        </p:spPr>
+        <p:txBody>
+          <a:bodyPr wrap="none" lIns="50800" tIns="50800" rIns="50800" bIns="50800" anchor="ctr">
+            <a:spAutoFit/>
+          </a:bodyPr>
+          <a:lstStyle>
+            <a:lvl1pPr>
+              <a:defRPr sz="6000" u="sng">
+                <a:solidFill>
+                  <a:srgbClr val="FFFFFF"/>
+                </a:solidFill>
+                <a:hlinkClick r:id="rId3"/>
+              </a:defRPr>
+            </a:lvl1pPr>
+          </a:lstStyle>
+          <a:p>
+            <a:pPr>
+              <a:defRPr u="none"/>
+            </a:pPr>
+            <a:r>
+              <a:rPr lang="pt-BR" dirty="0" smtClean="0"/>
+              <a:t>https://bit.ly/2T9JVNz</a:t>
+            </a:r>
+            <a:endParaRPr u="sng">
+              <a:hlinkClick r:id="rId3"/>
+            </a:endParaRPr>
           </a:p>
         </p:txBody>
       </p:sp>
@@ -6844,14 +6938,39 @@
       </p:grpSpPr>
       <p:sp>
         <p:nvSpPr>
-          <p:cNvPr id="295" name="Carefully follow the course guidelines!"/>
+          <p:cNvPr id="301" name="Communication"/>
+          <p:cNvSpPr txBox="1">
+            <a:spLocks noGrp="1"/>
+          </p:cNvSpPr>
+          <p:nvPr>
+            <p:ph type="title"/>
+          </p:nvPr>
+        </p:nvSpPr>
+        <p:spPr>
+          <a:prstGeom prst="rect">
+            <a:avLst/>
+          </a:prstGeom>
+        </p:spPr>
+        <p:txBody>
+          <a:bodyPr/>
+          <a:lstStyle/>
+          <a:p>
+            <a:r>
+              <a:t>Communication</a:t>
+            </a:r>
+          </a:p>
+        </p:txBody>
+      </p:sp>
+      <p:sp>
+        <p:nvSpPr>
+          <p:cNvPr id="302" name="ess-cc-ufpe.slack.com"/>
           <p:cNvSpPr txBox="1"/>
           <p:nvPr/>
         </p:nvSpPr>
         <p:spPr>
           <a:xfrm>
-            <a:off x="1270000" y="254000"/>
-            <a:ext cx="10464800" cy="2650386"/>
+            <a:off x="3331592" y="2609202"/>
+            <a:ext cx="6772338" cy="914401"/>
           </a:xfrm>
           <a:prstGeom prst="rect">
             <a:avLst/>
@@ -6861,41 +6980,47 @@
           </a:ln>
           <a:extLst>
             <a:ext uri="{C572A759-6A51-4108-AA02-DFA0A04FC94B}">
-              <ma14:wrappingTextBoxFlag xmlns:ma14="http://schemas.microsoft.com/office/mac/drawingml/2011/main" xmlns:a14="http://schemas.microsoft.com/office/drawing/2010/main" xmlns:m="http://schemas.openxmlformats.org/officeDocument/2006/math" xmlns="" val="1"/>
+              <ma14:wrappingTextBoxFlag xmlns="" xmlns:m="http://schemas.openxmlformats.org/officeDocument/2006/math" xmlns:a14="http://schemas.microsoft.com/office/drawing/2010/main" xmlns:ma14="http://schemas.microsoft.com/office/mac/drawingml/2011/main" val="1"/>
             </a:ext>
           </a:extLst>
         </p:spPr>
         <p:txBody>
-          <a:bodyPr lIns="50800" tIns="50800" rIns="50800" bIns="50800" anchor="ctr"/>
-          <a:lstStyle/>
-          <a:p>
-            <a:pPr lvl="1" algn="ctr" defTabSz="584200">
-              <a:defRPr sz="8400">
+          <a:bodyPr wrap="none" lIns="50800" tIns="50800" rIns="50800" bIns="50800" anchor="ctr">
+            <a:spAutoFit/>
+          </a:bodyPr>
+          <a:lstStyle>
+            <a:lvl1pPr>
+              <a:defRPr sz="5300" u="sng">
                 <a:solidFill>
                   <a:srgbClr val="FEFB27"/>
                 </a:solidFill>
-                <a:latin typeface="+mn-lt"/>
-                <a:ea typeface="+mn-ea"/>
-                <a:cs typeface="+mn-cs"/>
-                <a:sym typeface="Gill Sans"/>
+                <a:hlinkClick r:id="rId2"/>
               </a:defRPr>
+            </a:lvl1pPr>
+          </a:lstStyle>
+          <a:p>
+            <a:pPr>
+              <a:defRPr u="none"/>
             </a:pPr>
             <a:r>
-              <a:t>Carefully follow the course guidelines!</a:t>
-            </a:r>
-          </a:p>
-        </p:txBody>
-      </p:sp>
-      <p:sp>
-        <p:nvSpPr>
-          <p:cNvPr id="296" name="https://is.gd/essguidelines"/>
+              <a:rPr u="sng">
+                <a:hlinkClick r:id="rId2"/>
+              </a:rPr>
+              <a:t>ess-cc-ufpe.slack.com</a:t>
+            </a:r>
+          </a:p>
+        </p:txBody>
+      </p:sp>
+      <p:sp>
+        <p:nvSpPr>
+          <p:cNvPr id="303" name="#general, #naaula"/>
           <p:cNvSpPr txBox="1"/>
           <p:nvPr/>
         </p:nvSpPr>
         <p:spPr>
           <a:xfrm>
-            <a:off x="2644748" y="4519610"/>
-            <a:ext cx="7369005" cy="1025922"/>
+            <a:off x="5502268" y="3662354"/>
+            <a:ext cx="2099934" cy="718145"/>
           </a:xfrm>
           <a:prstGeom prst="rect">
             <a:avLst/>
@@ -6905,7 +7030,7 @@
           </a:ln>
           <a:extLst>
             <a:ext uri="{C572A759-6A51-4108-AA02-DFA0A04FC94B}">
-              <ma14:wrappingTextBoxFlag xmlns:ma14="http://schemas.microsoft.com/office/mac/drawingml/2011/main" xmlns:a14="http://schemas.microsoft.com/office/drawing/2010/main" xmlns:m="http://schemas.openxmlformats.org/officeDocument/2006/math" xmlns="" val="1"/>
+              <ma14:wrappingTextBoxFlag xmlns="" xmlns:m="http://schemas.openxmlformats.org/officeDocument/2006/math" xmlns:a14="http://schemas.microsoft.com/office/drawing/2010/main" xmlns:ma14="http://schemas.microsoft.com/office/mac/drawingml/2011/main" val="1"/>
             </a:ext>
           </a:extLst>
         </p:spPr>
@@ -6915,25 +7040,107 @@
           </a:bodyPr>
           <a:lstStyle>
             <a:lvl1pPr>
-              <a:defRPr sz="6000" u="sng">
+              <a:defRPr sz="4000">
+                <a:solidFill>
+                  <a:srgbClr val="FEFB27"/>
+                </a:solidFill>
+              </a:defRPr>
+            </a:lvl1pPr>
+          </a:lstStyle>
+          <a:p>
+            <a:r>
+              <a:rPr/>
+              <a:t>#</a:t>
+            </a:r>
+            <a:r>
+              <a:rPr smtClean="0"/>
+              <a:t>general</a:t>
+            </a:r>
+            <a:endParaRPr/>
+          </a:p>
+        </p:txBody>
+      </p:sp>
+      <p:sp>
+        <p:nvSpPr>
+          <p:cNvPr id="304" name="google classroom…"/>
+          <p:cNvSpPr txBox="1"/>
+          <p:nvPr/>
+        </p:nvSpPr>
+        <p:spPr>
+          <a:xfrm>
+            <a:off x="1573178" y="5734056"/>
+            <a:ext cx="10594247" cy="2180084"/>
+          </a:xfrm>
+          <a:prstGeom prst="rect">
+            <a:avLst/>
+          </a:prstGeom>
+          <a:ln w="12700">
+            <a:miter lim="400000"/>
+          </a:ln>
+          <a:extLst>
+            <a:ext uri="{C572A759-6A51-4108-AA02-DFA0A04FC94B}">
+              <ma14:wrappingTextBoxFlag xmlns="" xmlns:m="http://schemas.openxmlformats.org/officeDocument/2006/math" xmlns:a14="http://schemas.microsoft.com/office/drawing/2010/main" xmlns:ma14="http://schemas.microsoft.com/office/mac/drawingml/2011/main" val="1"/>
+            </a:ext>
+          </a:extLst>
+        </p:spPr>
+        <p:txBody>
+          <a:bodyPr wrap="none" lIns="50800" tIns="50800" rIns="50800" bIns="50800" anchor="ctr">
+            <a:spAutoFit/>
+          </a:bodyPr>
+          <a:lstStyle/>
+          <a:p>
+            <a:pPr algn="ctr">
+              <a:defRPr sz="4500">
                 <a:solidFill>
                   <a:srgbClr val="FFFFFF"/>
                 </a:solidFill>
-                <a:hlinkClick r:id="rId3"/>
               </a:defRPr>
-            </a:lvl1pPr>
-          </a:lstStyle>
+            </a:pPr>
+            <a:r>
+              <a:t>google classroom</a:t>
+            </a:r>
+          </a:p>
+          <a:p>
+            <a:pPr algn="ctr">
+              <a:defRPr sz="4500">
+                <a:solidFill>
+                  <a:srgbClr val="FFFFFF"/>
+                </a:solidFill>
+              </a:defRPr>
+            </a:pPr>
+            <a:endParaRPr/>
+          </a:p>
           <a:p>
             <a:pPr>
-              <a:defRPr u="none"/>
+              <a:defRPr sz="4500">
+                <a:solidFill>
+                  <a:srgbClr val="FFFFFF"/>
+                </a:solidFill>
+              </a:defRPr>
             </a:pPr>
             <a:r>
-              <a:rPr lang="pt-BR" dirty="0" smtClean="0"/>
-              <a:t>https://bit.ly/2T9JVNz</a:t>
-            </a:r>
-            <a:endParaRPr u="sng">
-              <a:hlinkClick r:id="rId3"/>
-            </a:endParaRPr>
+              <a:rPr lang="en-US" dirty="0" err="1" smtClean="0"/>
+              <a:t>damorim</a:t>
+            </a:r>
+            <a:r>
+              <a:rPr smtClean="0"/>
+              <a:t>@</a:t>
+            </a:r>
+            <a:r>
+              <a:rPr lang="en-US" dirty="0" smtClean="0"/>
+              <a:t>cin.ufpe.br</a:t>
+            </a:r>
+            <a:r>
+              <a:rPr smtClean="0"/>
+              <a:t> </a:t>
+            </a:r>
+            <a:r>
+              <a:rPr smtClean="0"/>
+              <a:t>([</a:t>
+            </a:r>
+            <a:r>
+              <a:t>ESS] no subject)</a:t>
+            </a:r>
           </a:p>
         </p:txBody>
       </p:sp>
@@ -7036,7 +7243,7 @@
       </p:grpSpPr>
       <p:sp>
         <p:nvSpPr>
-          <p:cNvPr id="301" name="Communication"/>
+          <p:cNvPr id="306" name="Para quem precisa de uma melhor base de leitura e escrita em Inglês, recomendo muito investir agora. Reforço fortemente a importância do domínio do Inglês para a carreira em computação, e a disponibilidade de cursos de Inglês de baixo custo no CAC e no S"/>
           <p:cNvSpPr txBox="1">
             <a:spLocks noGrp="1"/>
           </p:cNvSpPr>
@@ -7045,181 +7252,24 @@
           </p:nvPr>
         </p:nvSpPr>
         <p:spPr>
+          <a:xfrm>
+            <a:off x="1270000" y="2254471"/>
+            <a:ext cx="10464800" cy="5244658"/>
+          </a:xfrm>
           <a:prstGeom prst="rect">
             <a:avLst/>
           </a:prstGeom>
         </p:spPr>
         <p:txBody>
           <a:bodyPr/>
-          <a:lstStyle/>
-          <a:p>
-            <a:r>
-              <a:t>Communication</a:t>
-            </a:r>
-          </a:p>
-        </p:txBody>
-      </p:sp>
-      <p:sp>
-        <p:nvSpPr>
-          <p:cNvPr id="302" name="ess-cc-ufpe.slack.com"/>
-          <p:cNvSpPr txBox="1"/>
-          <p:nvPr/>
-        </p:nvSpPr>
-        <p:spPr>
-          <a:xfrm>
-            <a:off x="3331592" y="2609202"/>
-            <a:ext cx="6772338" cy="914401"/>
-          </a:xfrm>
-          <a:prstGeom prst="rect">
-            <a:avLst/>
-          </a:prstGeom>
-          <a:ln w="12700">
-            <a:miter lim="400000"/>
-          </a:ln>
-          <a:extLst>
-            <a:ext uri="{C572A759-6A51-4108-AA02-DFA0A04FC94B}">
-              <ma14:wrappingTextBoxFlag xmlns:ma14="http://schemas.microsoft.com/office/mac/drawingml/2011/main" xmlns:a14="http://schemas.microsoft.com/office/drawing/2010/main" xmlns:m="http://schemas.openxmlformats.org/officeDocument/2006/math" xmlns="" val="1"/>
-            </a:ext>
-          </a:extLst>
-        </p:spPr>
-        <p:txBody>
-          <a:bodyPr wrap="none" lIns="50800" tIns="50800" rIns="50800" bIns="50800" anchor="ctr">
-            <a:spAutoFit/>
-          </a:bodyPr>
           <a:lstStyle>
             <a:lvl1pPr>
-              <a:defRPr sz="5300" u="sng">
-                <a:solidFill>
-                  <a:srgbClr val="FEFB27"/>
-                </a:solidFill>
-                <a:hlinkClick r:id="rId2"/>
-              </a:defRPr>
+              <a:defRPr sz="4300"/>
             </a:lvl1pPr>
           </a:lstStyle>
           <a:p>
-            <a:pPr>
-              <a:defRPr u="none"/>
-            </a:pPr>
-            <a:r>
-              <a:rPr u="sng">
-                <a:hlinkClick r:id="rId2"/>
-              </a:rPr>
-              <a:t>ess-cc-ufpe.slack.com</a:t>
-            </a:r>
-          </a:p>
-        </p:txBody>
-      </p:sp>
-      <p:sp>
-        <p:nvSpPr>
-          <p:cNvPr id="303" name="#general, #naaula"/>
-          <p:cNvSpPr txBox="1"/>
-          <p:nvPr/>
-        </p:nvSpPr>
-        <p:spPr>
-          <a:xfrm>
-            <a:off x="4411513" y="3680224"/>
-            <a:ext cx="4181774" cy="711201"/>
-          </a:xfrm>
-          <a:prstGeom prst="rect">
-            <a:avLst/>
-          </a:prstGeom>
-          <a:ln w="12700">
-            <a:miter lim="400000"/>
-          </a:ln>
-          <a:extLst>
-            <a:ext uri="{C572A759-6A51-4108-AA02-DFA0A04FC94B}">
-              <ma14:wrappingTextBoxFlag xmlns:ma14="http://schemas.microsoft.com/office/mac/drawingml/2011/main" xmlns:a14="http://schemas.microsoft.com/office/drawing/2010/main" xmlns:m="http://schemas.openxmlformats.org/officeDocument/2006/math" xmlns="" val="1"/>
-            </a:ext>
-          </a:extLst>
-        </p:spPr>
-        <p:txBody>
-          <a:bodyPr wrap="none" lIns="50800" tIns="50800" rIns="50800" bIns="50800" anchor="ctr">
-            <a:spAutoFit/>
-          </a:bodyPr>
-          <a:lstStyle>
-            <a:lvl1pPr>
-              <a:defRPr sz="4000">
-                <a:solidFill>
-                  <a:srgbClr val="FEFB27"/>
-                </a:solidFill>
-              </a:defRPr>
-            </a:lvl1pPr>
-          </a:lstStyle>
-          <a:p>
-            <a:r>
-              <a:t>#general, #naaula</a:t>
-            </a:r>
-          </a:p>
-        </p:txBody>
-      </p:sp>
-      <p:sp>
-        <p:nvSpPr>
-          <p:cNvPr id="304" name="google classroom…"/>
-          <p:cNvSpPr txBox="1"/>
-          <p:nvPr/>
-        </p:nvSpPr>
-        <p:spPr>
-          <a:xfrm>
-            <a:off x="1930368" y="5662618"/>
-            <a:ext cx="8991244" cy="2180084"/>
-          </a:xfrm>
-          <a:prstGeom prst="rect">
-            <a:avLst/>
-          </a:prstGeom>
-          <a:ln w="12700">
-            <a:miter lim="400000"/>
-          </a:ln>
-          <a:extLst>
-            <a:ext uri="{C572A759-6A51-4108-AA02-DFA0A04FC94B}">
-              <ma14:wrappingTextBoxFlag xmlns:ma14="http://schemas.microsoft.com/office/mac/drawingml/2011/main" xmlns:a14="http://schemas.microsoft.com/office/drawing/2010/main" xmlns:m="http://schemas.openxmlformats.org/officeDocument/2006/math" xmlns="" val="1"/>
-            </a:ext>
-          </a:extLst>
-        </p:spPr>
-        <p:txBody>
-          <a:bodyPr wrap="none" lIns="50800" tIns="50800" rIns="50800" bIns="50800" anchor="ctr">
-            <a:spAutoFit/>
-          </a:bodyPr>
-          <a:lstStyle/>
-          <a:p>
-            <a:pPr algn="ctr">
-              <a:defRPr sz="4500">
-                <a:solidFill>
-                  <a:srgbClr val="FFFFFF"/>
-                </a:solidFill>
-              </a:defRPr>
-            </a:pPr>
-            <a:r>
-              <a:t>google classroom</a:t>
-            </a:r>
-          </a:p>
-          <a:p>
-            <a:pPr algn="ctr">
-              <a:defRPr sz="4500">
-                <a:solidFill>
-                  <a:srgbClr val="FFFFFF"/>
-                </a:solidFill>
-              </a:defRPr>
-            </a:pPr>
-            <a:endParaRPr/>
-          </a:p>
-          <a:p>
-            <a:pPr>
-              <a:defRPr sz="4500">
-                <a:solidFill>
-                  <a:srgbClr val="FFFFFF"/>
-                </a:solidFill>
-              </a:defRPr>
-            </a:pPr>
-            <a:r>
-              <a:rPr lang="en-US" dirty="0" err="1" smtClean="0"/>
-              <a:t>damorim</a:t>
-            </a:r>
-            <a:r>
-              <a:rPr smtClean="0"/>
-              <a:t>@ </a:t>
-            </a:r>
-            <a:r>
-              <a:t>(com [ESS] no subject)</a:t>
+            <a:r>
+              <a:t>Para quem precisa de uma melhor base de leitura e escrita em Inglês, recomendo muito investir agora. Reforço fortemente a importância do domínio do Inglês para a carreira em computação, e a disponibilidade de cursos de Inglês de baixo custo no CAC e no SENAC.</a:t>
             </a:r>
           </a:p>
         </p:txBody>
@@ -7259,7 +7309,7 @@
       </p:grpSpPr>
       <p:sp>
         <p:nvSpPr>
-          <p:cNvPr id="306" name="Para quem precisa de uma melhor base de leitura e escrita em Inglês, recomendo muito investir agora. Reforço fortemente a importância do domínio do Inglês para a carreira em computação, e a disponibilidade de cursos de Inglês de baixo custo no CAC e no S"/>
+          <p:cNvPr id="308" name="Course evaluation"/>
           <p:cNvSpPr txBox="1">
             <a:spLocks noGrp="1"/>
           </p:cNvSpPr>
@@ -7268,24 +7318,16 @@
           </p:nvPr>
         </p:nvSpPr>
         <p:spPr>
-          <a:xfrm>
-            <a:off x="1270000" y="2254471"/>
-            <a:ext cx="10464800" cy="5244658"/>
-          </a:xfrm>
           <a:prstGeom prst="rect">
             <a:avLst/>
           </a:prstGeom>
         </p:spPr>
         <p:txBody>
           <a:bodyPr/>
-          <a:lstStyle>
-            <a:lvl1pPr>
-              <a:defRPr sz="4300"/>
-            </a:lvl1pPr>
-          </a:lstStyle>
-          <a:p>
-            <a:r>
-              <a:t>Para quem precisa de uma melhor base de leitura e escrita em Inglês, recomendo muito investir agora. Reforço fortemente a importância do domínio do Inglês para a carreira em computação, e a disponibilidade de cursos de Inglês de baixo custo no CAC e no SENAC.</a:t>
+          <a:lstStyle/>
+          <a:p>
+            <a:r>
+              <a:t>Course evaluation</a:t>
             </a:r>
           </a:p>
         </p:txBody>
@@ -7325,7 +7367,7 @@
       </p:grpSpPr>
       <p:sp>
         <p:nvSpPr>
-          <p:cNvPr id="308" name="Course evaluation"/>
+          <p:cNvPr id="310" name="Learning goals"/>
           <p:cNvSpPr txBox="1">
             <a:spLocks noGrp="1"/>
           </p:cNvSpPr>
@@ -7334,6 +7376,10 @@
           </p:nvPr>
         </p:nvSpPr>
         <p:spPr>
+          <a:xfrm>
+            <a:off x="1270000" y="254000"/>
+            <a:ext cx="10464800" cy="2616801"/>
+          </a:xfrm>
           <a:prstGeom prst="rect">
             <a:avLst/>
           </a:prstGeom>
@@ -7343,11 +7389,70 @@
           <a:lstStyle/>
           <a:p>
             <a:r>
-              <a:t>Course evaluation</a:t>
-            </a:r>
-          </a:p>
-        </p:txBody>
-      </p:sp>
+              <a:t>Learning goals</a:t>
+            </a:r>
+          </a:p>
+        </p:txBody>
+      </p:sp>
+      <p:pic>
+        <p:nvPicPr>
+          <p:cNvPr id="311" name="Screen Shot 2018-02-24 at 18.37.18.png" descr="Screen Shot 2018-02-24 at 18.37.18.png"/>
+          <p:cNvPicPr>
+            <a:picLocks noChangeAspect="1"/>
+          </p:cNvPicPr>
+          <p:nvPr/>
+        </p:nvPicPr>
+        <p:blipFill>
+          <a:blip r:embed="rId2">
+            <a:extLst/>
+          </a:blip>
+          <a:srcRect l="1230" t="4826" b="4826"/>
+          <a:stretch>
+            <a:fillRect/>
+          </a:stretch>
+        </p:blipFill>
+        <p:spPr>
+          <a:xfrm>
+            <a:off x="353814" y="3584575"/>
+            <a:ext cx="12297347" cy="2584367"/>
+          </a:xfrm>
+          <a:prstGeom prst="rect">
+            <a:avLst/>
+          </a:prstGeom>
+          <a:ln w="12700">
+            <a:miter lim="400000"/>
+          </a:ln>
+        </p:spPr>
+      </p:pic>
+      <p:pic>
+        <p:nvPicPr>
+          <p:cNvPr id="312" name="Image" descr="Image"/>
+          <p:cNvPicPr>
+            <a:picLocks noChangeAspect="1"/>
+          </p:cNvPicPr>
+          <p:nvPr/>
+        </p:nvPicPr>
+        <p:blipFill>
+          <a:blip r:embed="rId3">
+            <a:extLst/>
+          </a:blip>
+          <a:stretch>
+            <a:fillRect/>
+          </a:stretch>
+        </p:blipFill>
+        <p:spPr>
+          <a:xfrm>
+            <a:off x="2147872" y="6508808"/>
+            <a:ext cx="8709056" cy="2584190"/>
+          </a:xfrm>
+          <a:prstGeom prst="rect">
+            <a:avLst/>
+          </a:prstGeom>
+          <a:ln w="12700">
+            <a:miter lim="400000"/>
+          </a:ln>
+        </p:spPr>
+      </p:pic>
     </p:spTree>
   </p:cSld>
   <p:clrMapOvr>
@@ -7383,7 +7488,7 @@
       </p:grpSpPr>
       <p:sp>
         <p:nvSpPr>
-          <p:cNvPr id="310" name="Learning goals"/>
+          <p:cNvPr id="314" name="Evaluation items"/>
           <p:cNvSpPr txBox="1">
             <a:spLocks noGrp="1"/>
           </p:cNvSpPr>
@@ -7392,10 +7497,6 @@
           </p:nvPr>
         </p:nvSpPr>
         <p:spPr>
-          <a:xfrm>
-            <a:off x="1270000" y="254000"/>
-            <a:ext cx="10464800" cy="2616801"/>
-          </a:xfrm>
           <a:prstGeom prst="rect">
             <a:avLst/>
           </a:prstGeom>
@@ -7405,70 +7506,101 @@
           <a:lstStyle/>
           <a:p>
             <a:r>
-              <a:t>Learning goals</a:t>
-            </a:r>
-          </a:p>
-        </p:txBody>
-      </p:sp>
-      <p:pic>
-        <p:nvPicPr>
-          <p:cNvPr id="311" name="Screen Shot 2018-02-24 at 18.37.18.png" descr="Screen Shot 2018-02-24 at 18.37.18.png"/>
-          <p:cNvPicPr>
-            <a:picLocks noChangeAspect="1"/>
-          </p:cNvPicPr>
-          <p:nvPr/>
-        </p:nvPicPr>
-        <p:blipFill>
-          <a:blip r:embed="rId2">
-            <a:extLst/>
-          </a:blip>
-          <a:srcRect l="1230" t="4826" b="4826"/>
-          <a:stretch>
-            <a:fillRect/>
-          </a:stretch>
-        </p:blipFill>
-        <p:spPr>
-          <a:xfrm>
-            <a:off x="353814" y="3584575"/>
-            <a:ext cx="12297347" cy="2584367"/>
-          </a:xfrm>
-          <a:prstGeom prst="rect">
-            <a:avLst/>
-          </a:prstGeom>
-          <a:ln w="12700">
-            <a:miter lim="400000"/>
-          </a:ln>
-        </p:spPr>
-      </p:pic>
-      <p:pic>
-        <p:nvPicPr>
-          <p:cNvPr id="312" name="Image" descr="Image"/>
-          <p:cNvPicPr>
-            <a:picLocks noChangeAspect="1"/>
-          </p:cNvPicPr>
-          <p:nvPr/>
-        </p:nvPicPr>
-        <p:blipFill>
-          <a:blip r:embed="rId3">
-            <a:extLst/>
-          </a:blip>
-          <a:stretch>
-            <a:fillRect/>
-          </a:stretch>
-        </p:blipFill>
-        <p:spPr>
-          <a:xfrm>
-            <a:off x="2147872" y="6508808"/>
-            <a:ext cx="8709056" cy="2584190"/>
-          </a:xfrm>
-          <a:prstGeom prst="rect">
-            <a:avLst/>
-          </a:prstGeom>
-          <a:ln w="12700">
-            <a:miter lim="400000"/>
-          </a:ln>
-        </p:spPr>
-      </p:pic>
+              <a:rPr lang="en-US" dirty="0" smtClean="0"/>
+              <a:t>Grading</a:t>
+            </a:r>
+            <a:endParaRPr/>
+          </a:p>
+        </p:txBody>
+      </p:sp>
+      <p:sp>
+        <p:nvSpPr>
+          <p:cNvPr id="315" name="Project (9)…"/>
+          <p:cNvSpPr txBox="1">
+            <a:spLocks noGrp="1"/>
+          </p:cNvSpPr>
+          <p:nvPr>
+            <p:ph type="body" idx="1"/>
+          </p:nvPr>
+        </p:nvSpPr>
+        <p:spPr>
+          <a:prstGeom prst="rect">
+            <a:avLst/>
+          </a:prstGeom>
+        </p:spPr>
+        <p:txBody>
+          <a:bodyPr/>
+          <a:lstStyle/>
+          <a:p>
+            <a:r>
+              <a:rPr/>
+              <a:t>Project </a:t>
+            </a:r>
+            <a:r>
+              <a:rPr smtClean="0"/>
+              <a:t>(</a:t>
+            </a:r>
+            <a:r>
+              <a:rPr lang="en-US" dirty="0" smtClean="0"/>
+              <a:t>6</a:t>
+            </a:r>
+            <a:r>
+              <a:rPr smtClean="0"/>
+              <a:t>)</a:t>
+            </a:r>
+            <a:endParaRPr/>
+          </a:p>
+          <a:p>
+            <a:r>
+              <a:rPr lang="en-US" dirty="0" smtClean="0"/>
+              <a:t>P</a:t>
+            </a:r>
+            <a:r>
+              <a:rPr smtClean="0"/>
+              <a:t>articipation </a:t>
+            </a:r>
+            <a:r>
+              <a:rPr smtClean="0"/>
+              <a:t>(</a:t>
+            </a:r>
+            <a:r>
+              <a:rPr lang="en-US" dirty="0" smtClean="0"/>
+              <a:t>1</a:t>
+            </a:r>
+            <a:r>
+              <a:rPr smtClean="0"/>
+              <a:t>)</a:t>
+            </a:r>
+            <a:endParaRPr/>
+          </a:p>
+          <a:p>
+            <a:r>
+              <a:rPr/>
+              <a:t>Quizzes </a:t>
+            </a:r>
+            <a:r>
+              <a:rPr smtClean="0"/>
+              <a:t>(</a:t>
+            </a:r>
+            <a:r>
+              <a:rPr lang="en-US" dirty="0" smtClean="0"/>
+              <a:t>2</a:t>
+            </a:r>
+            <a:r>
+              <a:rPr smtClean="0"/>
+              <a:t>)</a:t>
+            </a:r>
+            <a:endParaRPr lang="en-US" dirty="0" smtClean="0"/>
+          </a:p>
+          <a:p>
+            <a:r>
+              <a:rPr lang="en-US" dirty="0" smtClean="0"/>
+              <a:t>Exercise sets (1)</a:t>
+            </a:r>
+            <a:endParaRPr/>
+          </a:p>
+        </p:txBody>
+      </p:sp>
     </p:spTree>
   </p:cSld>
   <p:clrMapOvr>
@@ -7504,7 +7636,7 @@
       </p:grpSpPr>
       <p:sp>
         <p:nvSpPr>
-          <p:cNvPr id="314" name="Evaluation items"/>
+          <p:cNvPr id="317" name="Project evaluation"/>
           <p:cNvSpPr txBox="1">
             <a:spLocks noGrp="1"/>
           </p:cNvSpPr>
@@ -7522,14 +7654,14 @@
           <a:lstStyle/>
           <a:p>
             <a:r>
-              <a:t>Evaluation items</a:t>
-            </a:r>
-          </a:p>
-        </p:txBody>
-      </p:sp>
-      <p:sp>
-        <p:nvSpPr>
-          <p:cNvPr id="315" name="Project (9)…"/>
+              <a:t>Project evaluation</a:t>
+            </a:r>
+          </a:p>
+        </p:txBody>
+      </p:sp>
+      <p:sp>
+        <p:nvSpPr>
+          <p:cNvPr id="318" name="requirements (1)…"/>
           <p:cNvSpPr txBox="1">
             <a:spLocks noGrp="1"/>
           </p:cNvSpPr>
@@ -7538,6 +7670,10 @@
           </p:nvPr>
         </p:nvSpPr>
         <p:spPr>
+          <a:xfrm>
+            <a:off x="1270000" y="2533722"/>
+            <a:ext cx="10464800" cy="6679380"/>
+          </a:xfrm>
           <a:prstGeom prst="rect">
             <a:avLst/>
           </a:prstGeom>
@@ -7546,112 +7682,71 @@
           <a:bodyPr/>
           <a:lstStyle/>
           <a:p>
+            <a:pPr>
+              <a:defRPr sz="3900"/>
+            </a:pPr>
+            <a:r>
+              <a:t>requirements (1)</a:t>
+            </a:r>
+          </a:p>
+          <a:p>
+            <a:pPr>
+              <a:defRPr sz="3900"/>
+            </a:pPr>
+            <a:r>
+              <a:t>configuration management (1)</a:t>
+            </a:r>
+          </a:p>
+          <a:p>
+            <a:pPr>
+              <a:defRPr sz="3900"/>
+            </a:pPr>
+            <a:r>
+              <a:t>project management (1)</a:t>
+            </a:r>
+          </a:p>
+          <a:p>
+            <a:pPr>
+              <a:defRPr sz="3900"/>
+            </a:pPr>
+            <a:r>
+              <a:t>tests (2) </a:t>
+            </a:r>
+          </a:p>
+          <a:p>
+            <a:pPr>
+              <a:defRPr sz="3900"/>
+            </a:pPr>
+            <a:r>
+              <a:t>design and implementation (3)</a:t>
+            </a:r>
+          </a:p>
+          <a:p>
+            <a:pPr>
+              <a:defRPr sz="3900"/>
+            </a:pPr>
+            <a:r>
+              <a:t>refactoring (</a:t>
+            </a:r>
             <a:r>
               <a:rPr/>
-              <a:t>Project </a:t>
-            </a:r>
-            <a:r>
-              <a:rPr smtClean="0"/>
-              <a:t>(</a:t>
-            </a:r>
-            <a:r>
-              <a:rPr lang="en-US" dirty="0" smtClean="0"/>
-              <a:t>7</a:t>
+              <a:t>1</a:t>
             </a:r>
             <a:r>
               <a:rPr smtClean="0"/>
               <a:t>)</a:t>
             </a:r>
+            <a:endParaRPr lang="en-US" dirty="0" smtClean="0"/>
+          </a:p>
+          <a:p>
+            <a:pPr>
+              <a:defRPr sz="3900"/>
+            </a:pPr>
+            <a:r>
+              <a:rPr lang="en-US" dirty="0" smtClean="0"/>
+              <a:t>Individual presentation (1)</a:t>
+            </a:r>
             <a:endParaRPr/>
-          </a:p>
-          <a:p>
-            <a:r>
-              <a:t>Class and slack </a:t>
-            </a:r>
-            <a:r>
-              <a:rPr/>
-              <a:t>participation </a:t>
-            </a:r>
-            <a:r>
-              <a:rPr smtClean="0"/>
-              <a:t>(</a:t>
-            </a:r>
-            <a:r>
-              <a:rPr lang="en-US" dirty="0" smtClean="0"/>
-              <a:t>1</a:t>
-            </a:r>
-            <a:r>
-              <a:rPr smtClean="0"/>
-              <a:t>)</a:t>
-            </a:r>
-            <a:endParaRPr/>
-          </a:p>
-          <a:p>
-            <a:r>
-              <a:rPr/>
-              <a:t>Quizzes </a:t>
-            </a:r>
-            <a:r>
-              <a:rPr smtClean="0"/>
-              <a:t>(</a:t>
-            </a:r>
-            <a:r>
-              <a:rPr lang="en-US" dirty="0" smtClean="0"/>
-              <a:t>2</a:t>
-            </a:r>
-            <a:r>
-              <a:rPr smtClean="0"/>
-              <a:t>)</a:t>
-            </a:r>
-            <a:endParaRPr/>
-          </a:p>
-          <a:p>
-            <a:pPr>
-              <a:defRPr>
-                <a:solidFill>
-                  <a:srgbClr val="FEFB27"/>
-                </a:solidFill>
-              </a:defRPr>
-            </a:pPr>
-            <a:r>
-              <a:t>Exercise </a:t>
-            </a:r>
-            <a:r>
-              <a:rPr/>
-              <a:t>sets </a:t>
-            </a:r>
-            <a:r>
-              <a:rPr smtClean="0"/>
-              <a:t>(</a:t>
-            </a:r>
-            <a:r>
-              <a:rPr lang="en-US" dirty="0" smtClean="0"/>
-              <a:t>1</a:t>
-            </a:r>
-            <a:r>
-              <a:rPr smtClean="0"/>
-              <a:t> </a:t>
-            </a:r>
-            <a:r>
-              <a:t>extra points)</a:t>
-            </a:r>
-          </a:p>
-          <a:p>
-            <a:pPr marL="0" lvl="6" indent="1371600">
-              <a:spcBef>
-                <a:spcPts val="2400"/>
-              </a:spcBef>
-              <a:buSzTx/>
-              <a:buNone/>
-              <a:defRPr sz="3700">
-                <a:solidFill>
-                  <a:srgbClr val="FEFB27"/>
-                </a:solidFill>
-              </a:defRPr>
-            </a:pPr>
-            <a:r>
-              <a:t>includes questions related to the Project (so must be delivered on time)</a:t>
-            </a:r>
           </a:p>
         </p:txBody>
       </p:sp>
@@ -7690,7 +7785,7 @@
       </p:grpSpPr>
       <p:sp>
         <p:nvSpPr>
-          <p:cNvPr id="317" name="Project evaluation"/>
+          <p:cNvPr id="320" name="Class and slack participation"/>
           <p:cNvSpPr txBox="1">
             <a:spLocks noGrp="1"/>
           </p:cNvSpPr>
@@ -7699,6 +7794,10 @@
           </p:nvPr>
         </p:nvSpPr>
         <p:spPr>
+          <a:xfrm>
+            <a:off x="1270000" y="0"/>
+            <a:ext cx="10464800" cy="2438401"/>
+          </a:xfrm>
           <a:prstGeom prst="rect">
             <a:avLst/>
           </a:prstGeom>
@@ -7708,14 +7807,14 @@
           <a:lstStyle/>
           <a:p>
             <a:r>
-              <a:t>Project evaluation</a:t>
-            </a:r>
-          </a:p>
-        </p:txBody>
-      </p:sp>
-      <p:sp>
-        <p:nvSpPr>
-          <p:cNvPr id="318" name="requirements (1)…"/>
+              <a:t>Class and slack participation</a:t>
+            </a:r>
+          </a:p>
+        </p:txBody>
+      </p:sp>
+      <p:sp>
+        <p:nvSpPr>
+          <p:cNvPr id="321" name="Asking questions…"/>
           <p:cNvSpPr txBox="1">
             <a:spLocks noGrp="1"/>
           </p:cNvSpPr>
@@ -7725,8 +7824,8 @@
         </p:nvSpPr>
         <p:spPr>
           <a:xfrm>
-            <a:off x="1270000" y="2533722"/>
-            <a:ext cx="10464800" cy="6679380"/>
+            <a:off x="823489" y="1967249"/>
+            <a:ext cx="11648010" cy="7317702"/>
           </a:xfrm>
           <a:prstGeom prst="rect">
             <a:avLst/>
@@ -7736,63 +7835,41 @@
           <a:bodyPr/>
           <a:lstStyle/>
           <a:p>
+            <a:pPr lvl="1">
+              <a:defRPr sz="4100"/>
+            </a:pPr>
+            <a:endParaRPr/>
+          </a:p>
+          <a:p>
             <a:pPr>
-              <a:defRPr sz="3900"/>
+              <a:defRPr sz="4100"/>
             </a:pPr>
             <a:r>
-              <a:t>requirements (1)</a:t>
+              <a:t>Asking questions</a:t>
             </a:r>
           </a:p>
           <a:p>
             <a:pPr>
-              <a:defRPr sz="3900"/>
+              <a:defRPr sz="4100"/>
             </a:pPr>
             <a:r>
-              <a:t>configuration management (1)</a:t>
+              <a:t>Discussing topics</a:t>
             </a:r>
           </a:p>
           <a:p>
             <a:pPr>
-              <a:defRPr sz="3900"/>
+              <a:defRPr sz="4100"/>
             </a:pPr>
             <a:r>
-              <a:t>project management (1)</a:t>
+              <a:t>Answering questions from other students</a:t>
             </a:r>
           </a:p>
           <a:p>
             <a:pPr>
-              <a:defRPr sz="3900"/>
+              <a:defRPr sz="4100"/>
             </a:pPr>
             <a:r>
-              <a:t>tests (2) </a:t>
-            </a:r>
-          </a:p>
-          <a:p>
-            <a:pPr>
-              <a:defRPr sz="3900"/>
-            </a:pPr>
-            <a:r>
-              <a:t>design and implementation (3)</a:t>
-            </a:r>
-          </a:p>
-          <a:p>
-            <a:pPr>
-              <a:defRPr sz="3900"/>
-            </a:pPr>
-            <a:r>
-              <a:t>refactoring (1)</a:t>
-            </a:r>
-          </a:p>
-          <a:p>
-            <a:pPr>
-              <a:defRPr sz="3900">
-                <a:solidFill>
-                  <a:srgbClr val="FEFB27"/>
-                </a:solidFill>
-              </a:defRPr>
-            </a:pPr>
-            <a:r>
-              <a:t>individual presentation (practical and conceptual questions, auto-evaluation)</a:t>
+              <a:t>Correcting answers from other students</a:t>
             </a:r>
           </a:p>
         </p:txBody>
@@ -7803,13 +7880,6 @@
     <a:masterClrMapping/>
   </p:clrMapOvr>
   <p:transition spd="med"/>
-  <p:timing>
-    <p:tnLst>
-      <p:par>
-        <p:cTn id="1" dur="indefinite" restart="never" nodeType="tmRoot"/>
-      </p:par>
-    </p:tnLst>
-  </p:timing>
 </p:sld>
 </file>
 
@@ -7832,7 +7902,7 @@
       </p:grpSpPr>
       <p:sp>
         <p:nvSpPr>
-          <p:cNvPr id="320" name="Class and slack participation"/>
+          <p:cNvPr id="372" name="quizzes are answered during classes (check calendar)…"/>
           <p:cNvSpPr txBox="1">
             <a:spLocks noGrp="1"/>
           </p:cNvSpPr>
@@ -7842,8 +7912,8 @@
         </p:nvSpPr>
         <p:spPr>
           <a:xfrm>
-            <a:off x="1270000" y="0"/>
-            <a:ext cx="10464800" cy="2438401"/>
+            <a:off x="501608" y="548640"/>
+            <a:ext cx="12144460" cy="8656320"/>
           </a:xfrm>
           <a:prstGeom prst="rect">
             <a:avLst/>
@@ -7853,70 +7923,47 @@
           <a:bodyPr/>
           <a:lstStyle/>
           <a:p>
-            <a:r>
-              <a:t>Class and slack participation</a:t>
-            </a:r>
-          </a:p>
-        </p:txBody>
-      </p:sp>
-      <p:sp>
-        <p:nvSpPr>
-          <p:cNvPr id="321" name="Asking questions…"/>
-          <p:cNvSpPr txBox="1">
-            <a:spLocks noGrp="1"/>
-          </p:cNvSpPr>
-          <p:nvPr>
-            <p:ph type="body" idx="1"/>
-          </p:nvPr>
-        </p:nvSpPr>
-        <p:spPr>
-          <a:xfrm>
-            <a:off x="823489" y="1967249"/>
-            <a:ext cx="11648010" cy="7317702"/>
-          </a:xfrm>
-          <a:prstGeom prst="rect">
-            <a:avLst/>
-          </a:prstGeom>
-        </p:spPr>
-        <p:txBody>
-          <a:bodyPr/>
-          <a:lstStyle/>
-          <a:p>
-            <a:pPr lvl="1">
-              <a:defRPr sz="4100"/>
+            <a:pPr>
+              <a:defRPr sz="7000"/>
+            </a:pPr>
+            <a:r>
+              <a:t>quizzes are answered </a:t>
+            </a:r>
+            <a:r>
+              <a:rPr>
+                <a:solidFill>
+                  <a:srgbClr val="FEFB27"/>
+                </a:solidFill>
+              </a:rPr>
+              <a:t>during classes (check calendar)</a:t>
+            </a:r>
+          </a:p>
+          <a:p>
+            <a:pPr>
+              <a:defRPr sz="7000"/>
             </a:pPr>
             <a:endParaRPr/>
           </a:p>
           <a:p>
             <a:pPr>
-              <a:defRPr sz="4100"/>
+              <a:defRPr sz="7000"/>
             </a:pPr>
             <a:r>
-              <a:t>Asking questions</a:t>
+              <a:t>no second chance for quizzes</a:t>
             </a:r>
           </a:p>
           <a:p>
             <a:pPr>
-              <a:defRPr sz="4100"/>
+              <a:defRPr sz="7000"/>
             </a:pPr>
-            <a:r>
-              <a:t>Discussing topics</a:t>
-            </a:r>
+            <a:endParaRPr/>
           </a:p>
           <a:p>
             <a:pPr>
-              <a:defRPr sz="4100"/>
+              <a:defRPr sz="7000"/>
             </a:pPr>
             <a:r>
-              <a:t>Answering questions from other students</a:t>
-            </a:r>
-          </a:p>
-          <a:p>
-            <a:pPr>
-              <a:defRPr sz="4100"/>
-            </a:pPr>
-            <a:r>
-              <a:t>Correcting answers from other students</a:t>
+              <a:t>oral final exam</a:t>
             </a:r>
           </a:p>
         </p:txBody>
@@ -7949,7 +7996,7 @@
       </p:grpSpPr>
       <p:sp>
         <p:nvSpPr>
-          <p:cNvPr id="372" name="quizzes are answered during classes (check calendar)…"/>
+          <p:cNvPr id="376" name="Introduce yourself..."/>
           <p:cNvSpPr txBox="1">
             <a:spLocks noGrp="1"/>
           </p:cNvSpPr>
@@ -7958,10 +8005,6 @@
           </p:nvPr>
         </p:nvSpPr>
         <p:spPr>
-          <a:xfrm>
-            <a:off x="501608" y="548640"/>
-            <a:ext cx="12144460" cy="8656320"/>
-          </a:xfrm>
           <a:prstGeom prst="rect">
             <a:avLst/>
           </a:prstGeom>
@@ -7970,47 +8013,51 @@
           <a:bodyPr/>
           <a:lstStyle/>
           <a:p>
-            <a:pPr>
-              <a:defRPr sz="7000"/>
-            </a:pPr>
-            <a:r>
-              <a:t>quizzes are answered </a:t>
-            </a:r>
-            <a:r>
-              <a:rPr>
-                <a:solidFill>
-                  <a:srgbClr val="FEFB27"/>
-                </a:solidFill>
-              </a:rPr>
-              <a:t>during classes (check calendar)</a:t>
-            </a:r>
-          </a:p>
-          <a:p>
-            <a:pPr>
-              <a:defRPr sz="7000"/>
-            </a:pPr>
-            <a:endParaRPr/>
-          </a:p>
-          <a:p>
-            <a:pPr>
-              <a:defRPr sz="7000"/>
-            </a:pPr>
-            <a:r>
-              <a:t>no second chance for quizzes</a:t>
-            </a:r>
-          </a:p>
-          <a:p>
-            <a:pPr>
-              <a:defRPr sz="7000"/>
-            </a:pPr>
-            <a:endParaRPr/>
-          </a:p>
-          <a:p>
-            <a:pPr>
-              <a:defRPr sz="7000"/>
-            </a:pPr>
-            <a:r>
-              <a:t>oral final exam</a:t>
+            <a:r>
+              <a:rPr lang="en-US" dirty="0" smtClean="0"/>
+              <a:t>Assignment: </a:t>
+            </a:r>
+            <a:r>
+              <a:rPr smtClean="0"/>
+              <a:t>Introduce </a:t>
+            </a:r>
+            <a:r>
+              <a:t>yourself...</a:t>
+            </a:r>
+          </a:p>
+        </p:txBody>
+      </p:sp>
+      <p:sp>
+        <p:nvSpPr>
+          <p:cNvPr id="377" name="Name…"/>
+          <p:cNvSpPr txBox="1">
+            <a:spLocks noGrp="1"/>
+          </p:cNvSpPr>
+          <p:nvPr>
+            <p:ph type="body" idx="1"/>
+          </p:nvPr>
+        </p:nvSpPr>
+        <p:spPr>
+          <a:prstGeom prst="rect">
+            <a:avLst/>
+          </a:prstGeom>
+        </p:spPr>
+        <p:txBody>
+          <a:bodyPr/>
+          <a:lstStyle/>
+          <a:p>
+            <a:r>
+              <a:t>Name</a:t>
+            </a:r>
+          </a:p>
+          <a:p>
+            <a:r>
+              <a:t>What do you expect from this course?</a:t>
+            </a:r>
+          </a:p>
+          <a:p>
+            <a:r>
+              <a:t>What questions do you have about the course?</a:t>
             </a:r>
           </a:p>
         </p:txBody>
@@ -8025,100 +8072,6 @@
 </file>
 
 <file path=ppt/slides/slide28.xml><?xml version="1.0" encoding="utf-8"?>
-<p:sld xmlns:a="http://schemas.openxmlformats.org/drawingml/2006/main" xmlns:r="http://schemas.openxmlformats.org/officeDocument/2006/relationships" xmlns:p="http://schemas.openxmlformats.org/presentationml/2006/main">
-  <p:cSld>
-    <p:spTree>
-      <p:nvGrpSpPr>
-        <p:cNvPr id="1" name=""/>
-        <p:cNvGrpSpPr/>
-        <p:nvPr/>
-      </p:nvGrpSpPr>
-      <p:grpSpPr>
-        <a:xfrm>
-          <a:off x="0" y="0"/>
-          <a:ext cx="0" cy="0"/>
-          <a:chOff x="0" y="0"/>
-          <a:chExt cx="0" cy="0"/>
-        </a:xfrm>
-      </p:grpSpPr>
-      <p:sp>
-        <p:nvSpPr>
-          <p:cNvPr id="376" name="Introduce yourself..."/>
-          <p:cNvSpPr txBox="1">
-            <a:spLocks noGrp="1"/>
-          </p:cNvSpPr>
-          <p:nvPr>
-            <p:ph type="title"/>
-          </p:nvPr>
-        </p:nvSpPr>
-        <p:spPr>
-          <a:prstGeom prst="rect">
-            <a:avLst/>
-          </a:prstGeom>
-        </p:spPr>
-        <p:txBody>
-          <a:bodyPr/>
-          <a:lstStyle/>
-          <a:p>
-            <a:r>
-              <a:rPr lang="en-US" dirty="0" smtClean="0"/>
-              <a:t>Assignment: </a:t>
-            </a:r>
-            <a:r>
-              <a:rPr smtClean="0"/>
-              <a:t>Introduce </a:t>
-            </a:r>
-            <a:r>
-              <a:t>yourself...</a:t>
-            </a:r>
-          </a:p>
-        </p:txBody>
-      </p:sp>
-      <p:sp>
-        <p:nvSpPr>
-          <p:cNvPr id="377" name="Name…"/>
-          <p:cNvSpPr txBox="1">
-            <a:spLocks noGrp="1"/>
-          </p:cNvSpPr>
-          <p:nvPr>
-            <p:ph type="body" idx="1"/>
-          </p:nvPr>
-        </p:nvSpPr>
-        <p:spPr>
-          <a:prstGeom prst="rect">
-            <a:avLst/>
-          </a:prstGeom>
-        </p:spPr>
-        <p:txBody>
-          <a:bodyPr/>
-          <a:lstStyle/>
-          <a:p>
-            <a:r>
-              <a:t>Name</a:t>
-            </a:r>
-          </a:p>
-          <a:p>
-            <a:r>
-              <a:t>What do you expect from this course?</a:t>
-            </a:r>
-          </a:p>
-          <a:p>
-            <a:r>
-              <a:t>What questions do you have about the course?</a:t>
-            </a:r>
-          </a:p>
-        </p:txBody>
-      </p:sp>
-    </p:spTree>
-  </p:cSld>
-  <p:clrMapOvr>
-    <a:masterClrMapping/>
-  </p:clrMapOvr>
-  <p:transition spd="med"/>
-</p:sld>
-</file>
-
-<file path=ppt/slides/slide29.xml><?xml version="1.0" encoding="utf-8"?>
 <p:sld xmlns:a="http://schemas.openxmlformats.org/drawingml/2006/main" xmlns:r="http://schemas.openxmlformats.org/officeDocument/2006/relationships" xmlns:p="http://schemas.openxmlformats.org/presentationml/2006/main">
   <p:cSld>
     <p:spTree>
@@ -8563,7 +8516,7 @@
       </p:grpSpPr>
       <p:sp>
         <p:nvSpPr>
-          <p:cNvPr id="239" name="Thoughtworks core values and practices"/>
+          <p:cNvPr id="242" name="Expected results"/>
           <p:cNvSpPr txBox="1">
             <a:spLocks noGrp="1"/>
           </p:cNvSpPr>
@@ -8578,56 +8531,63 @@
         </p:spPr>
         <p:txBody>
           <a:bodyPr/>
-          <a:lstStyle>
-            <a:lvl1pPr>
-              <a:defRPr u="sng">
-                <a:hlinkClick r:id="rId2"/>
-              </a:defRPr>
-            </a:lvl1pPr>
-          </a:lstStyle>
-          <a:p>
-            <a:pPr>
-              <a:defRPr u="none"/>
-            </a:pPr>
-            <a:r>
-              <a:rPr>
-                <a:hlinkClick r:id="rId2"/>
-              </a:rPr>
-              <a:t>Thoughtworks core values and practices</a:t>
-            </a:r>
-          </a:p>
-        </p:txBody>
-      </p:sp>
-      <p:pic>
-        <p:nvPicPr>
-          <p:cNvPr id="240" name="Image" descr="Image"/>
-          <p:cNvPicPr>
-            <a:picLocks noChangeAspect="1"/>
-          </p:cNvPicPr>
-          <p:nvPr/>
-        </p:nvPicPr>
-        <p:blipFill>
-          <a:blip r:embed="rId3">
-            <a:extLst/>
-          </a:blip>
-          <a:srcRect l="22145" t="4241" r="22145" b="4241"/>
-          <a:stretch>
-            <a:fillRect/>
-          </a:stretch>
-        </p:blipFill>
+          <a:lstStyle/>
+          <a:p>
+            <a:r>
+              <a:rPr/>
+              <a:t>Expected </a:t>
+            </a:r>
+            <a:r>
+              <a:rPr lang="en-US" dirty="0" smtClean="0"/>
+              <a:t>R</a:t>
+            </a:r>
+            <a:r>
+              <a:rPr smtClean="0"/>
+              <a:t>esults</a:t>
+            </a:r>
+            <a:endParaRPr/>
+          </a:p>
+        </p:txBody>
+      </p:sp>
+      <p:sp>
+        <p:nvSpPr>
+          <p:cNvPr id="243" name="Develop quality systems, in a productive way, using techniques and tools…"/>
+          <p:cNvSpPr txBox="1">
+            <a:spLocks noGrp="1"/>
+          </p:cNvSpPr>
+          <p:nvPr>
+            <p:ph type="body" idx="1"/>
+          </p:nvPr>
+        </p:nvSpPr>
         <p:spPr>
           <a:xfrm>
-            <a:off x="3084139" y="3054195"/>
-            <a:ext cx="6474279" cy="6442466"/>
+            <a:off x="1270000" y="2768600"/>
+            <a:ext cx="10876002" cy="6448407"/>
           </a:xfrm>
           <a:prstGeom prst="rect">
             <a:avLst/>
           </a:prstGeom>
-          <a:ln w="12700">
-            <a:miter lim="400000"/>
-          </a:ln>
-        </p:spPr>
-      </p:pic>
+        </p:spPr>
+        <p:txBody>
+          <a:bodyPr/>
+          <a:lstStyle/>
+          <a:p>
+            <a:r>
+              <a:t>Develop quality systems, in a productive way, using techniques and tools</a:t>
+            </a:r>
+          </a:p>
+          <a:p>
+            <a:r>
+              <a:t>Apply refactoring techniques to increase code reuse and modularity</a:t>
+            </a:r>
+          </a:p>
+          <a:p>
+            <a:r>
+              <a:t>Critically compare techniques and tools, identifying their advantages, disadvantages, and limitations</a:t>
+            </a:r>
+          </a:p>
+        </p:txBody>
+      </p:sp>
     </p:spTree>
   </p:cSld>
   <p:clrMapOvr>
@@ -8663,7 +8623,7 @@
       </p:grpSpPr>
       <p:sp>
         <p:nvSpPr>
-          <p:cNvPr id="242" name="Expected results"/>
+          <p:cNvPr id="245" name="Focus on Software as a Service (SaaS), not systems in general"/>
           <p:cNvSpPr txBox="1">
             <a:spLocks noGrp="1"/>
           </p:cNvSpPr>
@@ -8672,6 +8632,10 @@
           </p:nvPr>
         </p:nvSpPr>
         <p:spPr>
+          <a:xfrm>
+            <a:off x="1270000" y="1631771"/>
+            <a:ext cx="10464800" cy="6490058"/>
+          </a:xfrm>
           <a:prstGeom prst="rect">
             <a:avLst/>
           </a:prstGeom>
@@ -8681,56 +8645,26 @@
           <a:lstStyle/>
           <a:p>
             <a:r>
+              <a:t>Focus on Software as a Service (</a:t>
+            </a:r>
+            <a:r>
               <a:rPr/>
-              <a:t>Expected </a:t>
+              <a:t>SaaS</a:t>
+            </a:r>
+            <a:r>
+              <a:rPr smtClean="0"/>
+              <a:t>),</a:t>
             </a:r>
             <a:r>
               <a:rPr lang="en-US" dirty="0" smtClean="0"/>
-              <a:t>R</a:t>
+              <a:t> </a:t>
             </a:r>
             <a:r>
               <a:rPr smtClean="0"/>
-              <a:t>esults</a:t>
-            </a:r>
-            <a:endParaRPr/>
-          </a:p>
-        </p:txBody>
-      </p:sp>
-      <p:sp>
-        <p:nvSpPr>
-          <p:cNvPr id="243" name="Develop quality systems, in a productive way, using techniques and tools…"/>
-          <p:cNvSpPr txBox="1">
-            <a:spLocks noGrp="1"/>
-          </p:cNvSpPr>
-          <p:nvPr>
-            <p:ph type="body" idx="1"/>
-          </p:nvPr>
-        </p:nvSpPr>
-        <p:spPr>
-          <a:xfrm>
-            <a:off x="1270000" y="2768600"/>
-            <a:ext cx="10876002" cy="6448407"/>
-          </a:xfrm>
-          <a:prstGeom prst="rect">
-            <a:avLst/>
-          </a:prstGeom>
-        </p:spPr>
-        <p:txBody>
-          <a:bodyPr/>
-          <a:lstStyle/>
-          <a:p>
-            <a:r>
-              <a:t>Develop quality systems, in a productive way, using techniques and tools</a:t>
-            </a:r>
-          </a:p>
-          <a:p>
-            <a:r>
-              <a:t>Apply refactoring techniques to increase code reuse and modularity</a:t>
-            </a:r>
-          </a:p>
-          <a:p>
-            <a:r>
-              <a:t>Critically compare techniques and tools, identifying their advantages, disadvantages, and limitations</a:t>
+              <a:t>not </a:t>
+            </a:r>
+            <a:r>
+              <a:t>systems in general</a:t>
             </a:r>
           </a:p>
         </p:txBody>
@@ -8770,7 +8704,7 @@
       </p:grpSpPr>
       <p:sp>
         <p:nvSpPr>
-          <p:cNvPr id="245" name="Focus on Software as a Service (SaaS), not systems in general"/>
+          <p:cNvPr id="247" name="Focus on Agile development, not more rigorous techniques"/>
           <p:cNvSpPr txBox="1">
             <a:spLocks noGrp="1"/>
           </p:cNvSpPr>
@@ -8792,26 +8726,7 @@
           <a:lstStyle/>
           <a:p>
             <a:r>
-              <a:t>Focus on Software as a Service (</a:t>
-            </a:r>
-            <a:r>
-              <a:rPr/>
-              <a:t>SaaS</a:t>
-            </a:r>
-            <a:r>
-              <a:rPr smtClean="0"/>
-              <a:t>),</a:t>
-            </a:r>
-            <a:r>
-              <a:rPr lang="en-US" dirty="0" smtClean="0"/>
-              <a:t> </a:t>
-            </a:r>
-            <a:r>
-              <a:rPr smtClean="0"/>
-              <a:t>not </a:t>
-            </a:r>
-            <a:r>
-              <a:t>systems in general</a:t>
+              <a:t>Focus on Agile development, not more rigorous techniques</a:t>
             </a:r>
           </a:p>
         </p:txBody>
@@ -8851,7 +8766,7 @@
       </p:grpSpPr>
       <p:sp>
         <p:nvSpPr>
-          <p:cNvPr id="247" name="Focus on Agile development, not more rigorous techniques"/>
+          <p:cNvPr id="251" name="You will not become a software engineer with this course, but you will find out the way to become one!"/>
           <p:cNvSpPr txBox="1">
             <a:spLocks noGrp="1"/>
           </p:cNvSpPr>
@@ -8873,7 +8788,18 @@
           <a:lstStyle/>
           <a:p>
             <a:r>
-              <a:t>Focus on Agile development, not more rigorous techniques</a:t>
+              <a:t>You will </a:t>
+            </a:r>
+            <a:r>
+              <a:rPr>
+                <a:solidFill>
+                  <a:srgbClr val="FEFB27"/>
+                </a:solidFill>
+              </a:rPr>
+              <a:t>not</a:t>
+            </a:r>
+            <a:r>
+              <a:t> become a software engineer with this course, but you will find out the way to become one!</a:t>
             </a:r>
           </a:p>
         </p:txBody>
@@ -8913,7 +8839,7 @@
       </p:grpSpPr>
       <p:sp>
         <p:nvSpPr>
-          <p:cNvPr id="251" name="You will not become a software engineer with this course, but you will find out the way to become one!"/>
+          <p:cNvPr id="255" name="Tasks and recommendations"/>
           <p:cNvSpPr txBox="1">
             <a:spLocks noGrp="1"/>
           </p:cNvSpPr>
@@ -8922,10 +8848,6 @@
           </p:nvPr>
         </p:nvSpPr>
         <p:spPr>
-          <a:xfrm>
-            <a:off x="1270000" y="1631771"/>
-            <a:ext cx="10464800" cy="6490058"/>
-          </a:xfrm>
           <a:prstGeom prst="rect">
             <a:avLst/>
           </a:prstGeom>
@@ -8935,18 +8857,7 @@
           <a:lstStyle/>
           <a:p>
             <a:r>
-              <a:t>You will </a:t>
-            </a:r>
-            <a:r>
-              <a:rPr>
-                <a:solidFill>
-                  <a:srgbClr val="FEFB27"/>
-                </a:solidFill>
-              </a:rPr>
-              <a:t>not</a:t>
-            </a:r>
-            <a:r>
-              <a:t> become a software engineer with this course, but you will find out the way to become one!</a:t>
+              <a:t>Tasks and recommendations</a:t>
             </a:r>
           </a:p>
         </p:txBody>

</xml_diff>